<commit_message>
Add a new figure to show the sequrity groups
</commit_message>
<xml_diff>
--- a/images/openvnet/src/figures_yamazaki.pptx
+++ b/images/openvnet/src/figures_yamazaki.pptx
@@ -6,7 +6,8 @@
   </p:sldMasterIdLst>
   <p:sldIdLst>
     <p:sldId id="256" r:id="rId2"/>
-    <p:sldId id="257" r:id="rId3"/>
+    <p:sldId id="258" r:id="rId3"/>
+    <p:sldId id="257" r:id="rId4"/>
   </p:sldIdLst>
   <p:sldSz cx="9144000" cy="6858000" type="screen4x3"/>
   <p:notesSz cx="6858000" cy="9144000"/>
@@ -4937,6 +4938,2236 @@
 </file>
 
 <file path=ppt/slides/slide2.xml><?xml version="1.0" encoding="utf-8"?>
+<p:sld xmlns:a="http://schemas.openxmlformats.org/drawingml/2006/main" xmlns:r="http://schemas.openxmlformats.org/officeDocument/2006/relationships" xmlns:p="http://schemas.openxmlformats.org/presentationml/2006/main">
+  <p:cSld>
+    <p:spTree>
+      <p:nvGrpSpPr>
+        <p:cNvPr id="1" name=""/>
+        <p:cNvGrpSpPr/>
+        <p:nvPr/>
+      </p:nvGrpSpPr>
+      <p:grpSpPr>
+        <a:xfrm>
+          <a:off x="0" y="0"/>
+          <a:ext cx="0" cy="0"/>
+          <a:chOff x="0" y="0"/>
+          <a:chExt cx="0" cy="0"/>
+        </a:xfrm>
+      </p:grpSpPr>
+      <p:sp>
+        <p:nvSpPr>
+          <p:cNvPr id="26" name="正方形/長方形 25"/>
+          <p:cNvSpPr/>
+          <p:nvPr/>
+        </p:nvSpPr>
+        <p:spPr>
+          <a:xfrm>
+            <a:off x="3376207" y="394180"/>
+            <a:ext cx="2785858" cy="3737409"/>
+          </a:xfrm>
+          <a:prstGeom prst="rect">
+            <a:avLst/>
+          </a:prstGeom>
+        </p:spPr>
+        <p:style>
+          <a:lnRef idx="2">
+            <a:schemeClr val="accent2"/>
+          </a:lnRef>
+          <a:fillRef idx="1">
+            <a:schemeClr val="lt1"/>
+          </a:fillRef>
+          <a:effectRef idx="0">
+            <a:schemeClr val="accent2"/>
+          </a:effectRef>
+          <a:fontRef idx="minor">
+            <a:schemeClr val="dk1"/>
+          </a:fontRef>
+        </p:style>
+        <p:txBody>
+          <a:bodyPr rtlCol="0" anchor="t"/>
+          <a:lstStyle/>
+          <a:p>
+            <a:pPr algn="ctr"/>
+            <a:r>
+              <a:rPr kumimoji="1" lang="ja-JP" altLang="en-US" dirty="0" smtClean="0"/>
+              <a:t>物理マシン</a:t>
+            </a:r>
+            <a:r>
+              <a:rPr kumimoji="1" lang="en-US" altLang="ja-JP" dirty="0" smtClean="0"/>
+              <a:t>Y</a:t>
+            </a:r>
+            <a:endParaRPr kumimoji="1" lang="ja-JP" altLang="en-US" dirty="0"/>
+          </a:p>
+        </p:txBody>
+      </p:sp>
+      <p:sp>
+        <p:nvSpPr>
+          <p:cNvPr id="25" name="正方形/長方形 24"/>
+          <p:cNvSpPr/>
+          <p:nvPr/>
+        </p:nvSpPr>
+        <p:spPr>
+          <a:xfrm>
+            <a:off x="437949" y="394180"/>
+            <a:ext cx="2785858" cy="3737409"/>
+          </a:xfrm>
+          <a:prstGeom prst="rect">
+            <a:avLst/>
+          </a:prstGeom>
+        </p:spPr>
+        <p:style>
+          <a:lnRef idx="2">
+            <a:schemeClr val="accent2"/>
+          </a:lnRef>
+          <a:fillRef idx="1">
+            <a:schemeClr val="lt1"/>
+          </a:fillRef>
+          <a:effectRef idx="0">
+            <a:schemeClr val="accent2"/>
+          </a:effectRef>
+          <a:fontRef idx="minor">
+            <a:schemeClr val="dk1"/>
+          </a:fontRef>
+        </p:style>
+        <p:txBody>
+          <a:bodyPr rtlCol="0" anchor="t"/>
+          <a:lstStyle/>
+          <a:p>
+            <a:pPr algn="ctr"/>
+            <a:r>
+              <a:rPr kumimoji="1" lang="ja-JP" altLang="en-US" dirty="0" smtClean="0"/>
+              <a:t>物理マシン</a:t>
+            </a:r>
+            <a:r>
+              <a:rPr kumimoji="1" lang="en-US" altLang="ja-JP" dirty="0" smtClean="0"/>
+              <a:t>X</a:t>
+            </a:r>
+            <a:endParaRPr kumimoji="1" lang="ja-JP" altLang="en-US" dirty="0"/>
+          </a:p>
+        </p:txBody>
+      </p:sp>
+      <p:grpSp>
+        <p:nvGrpSpPr>
+          <p:cNvPr id="10" name="図形グループ 9"/>
+          <p:cNvGrpSpPr/>
+          <p:nvPr/>
+        </p:nvGrpSpPr>
+        <p:grpSpPr>
+          <a:xfrm>
+            <a:off x="729916" y="3255633"/>
+            <a:ext cx="2218939" cy="540173"/>
+            <a:chOff x="802906" y="3255633"/>
+            <a:chExt cx="2218939" cy="540173"/>
+          </a:xfrm>
+        </p:grpSpPr>
+        <p:sp>
+          <p:nvSpPr>
+            <p:cNvPr id="4" name="角丸四角形 3"/>
+            <p:cNvSpPr/>
+            <p:nvPr/>
+          </p:nvSpPr>
+          <p:spPr>
+            <a:xfrm>
+              <a:off x="802906" y="3255633"/>
+              <a:ext cx="2218939" cy="540173"/>
+            </a:xfrm>
+            <a:prstGeom prst="roundRect">
+              <a:avLst/>
+            </a:prstGeom>
+          </p:spPr>
+          <p:style>
+            <a:lnRef idx="1">
+              <a:schemeClr val="accent1"/>
+            </a:lnRef>
+            <a:fillRef idx="3">
+              <a:schemeClr val="accent1"/>
+            </a:fillRef>
+            <a:effectRef idx="2">
+              <a:schemeClr val="accent1"/>
+            </a:effectRef>
+            <a:fontRef idx="minor">
+              <a:schemeClr val="lt1"/>
+            </a:fontRef>
+          </p:style>
+          <p:txBody>
+            <a:bodyPr rtlCol="0" anchor="ctr"/>
+            <a:lstStyle/>
+            <a:p>
+              <a:pPr algn="ctr"/>
+              <a:endParaRPr kumimoji="1" lang="ja-JP" altLang="en-US"/>
+            </a:p>
+          </p:txBody>
+        </p:sp>
+        <p:sp>
+          <p:nvSpPr>
+            <p:cNvPr id="5" name="正方形/長方形 4"/>
+            <p:cNvSpPr/>
+            <p:nvPr/>
+          </p:nvSpPr>
+          <p:spPr>
+            <a:xfrm>
+              <a:off x="1007281" y="3401626"/>
+              <a:ext cx="233572" cy="233588"/>
+            </a:xfrm>
+            <a:prstGeom prst="rect">
+              <a:avLst/>
+            </a:prstGeom>
+          </p:spPr>
+          <p:style>
+            <a:lnRef idx="2">
+              <a:schemeClr val="dk1">
+                <a:shade val="50000"/>
+              </a:schemeClr>
+            </a:lnRef>
+            <a:fillRef idx="1">
+              <a:schemeClr val="dk1"/>
+            </a:fillRef>
+            <a:effectRef idx="0">
+              <a:schemeClr val="dk1"/>
+            </a:effectRef>
+            <a:fontRef idx="minor">
+              <a:schemeClr val="lt1"/>
+            </a:fontRef>
+          </p:style>
+          <p:txBody>
+            <a:bodyPr rtlCol="0" anchor="ctr"/>
+            <a:lstStyle/>
+            <a:p>
+              <a:pPr algn="ctr"/>
+              <a:endParaRPr kumimoji="1" lang="ja-JP" altLang="en-US"/>
+            </a:p>
+          </p:txBody>
+        </p:sp>
+        <p:sp>
+          <p:nvSpPr>
+            <p:cNvPr id="6" name="正方形/長方形 5"/>
+            <p:cNvSpPr/>
+            <p:nvPr/>
+          </p:nvSpPr>
+          <p:spPr>
+            <a:xfrm>
+              <a:off x="1393253" y="3401626"/>
+              <a:ext cx="233572" cy="233588"/>
+            </a:xfrm>
+            <a:prstGeom prst="rect">
+              <a:avLst/>
+            </a:prstGeom>
+          </p:spPr>
+          <p:style>
+            <a:lnRef idx="2">
+              <a:schemeClr val="dk1">
+                <a:shade val="50000"/>
+              </a:schemeClr>
+            </a:lnRef>
+            <a:fillRef idx="1">
+              <a:schemeClr val="dk1"/>
+            </a:fillRef>
+            <a:effectRef idx="0">
+              <a:schemeClr val="dk1"/>
+            </a:effectRef>
+            <a:fontRef idx="minor">
+              <a:schemeClr val="lt1"/>
+            </a:fontRef>
+          </p:style>
+          <p:txBody>
+            <a:bodyPr rtlCol="0" anchor="ctr"/>
+            <a:lstStyle/>
+            <a:p>
+              <a:pPr algn="ctr"/>
+              <a:endParaRPr kumimoji="1" lang="ja-JP" altLang="en-US"/>
+            </a:p>
+          </p:txBody>
+        </p:sp>
+        <p:sp>
+          <p:nvSpPr>
+            <p:cNvPr id="7" name="正方形/長方形 6"/>
+            <p:cNvSpPr/>
+            <p:nvPr/>
+          </p:nvSpPr>
+          <p:spPr>
+            <a:xfrm>
+              <a:off x="1785641" y="3401626"/>
+              <a:ext cx="233572" cy="233588"/>
+            </a:xfrm>
+            <a:prstGeom prst="rect">
+              <a:avLst/>
+            </a:prstGeom>
+          </p:spPr>
+          <p:style>
+            <a:lnRef idx="2">
+              <a:schemeClr val="dk1">
+                <a:shade val="50000"/>
+              </a:schemeClr>
+            </a:lnRef>
+            <a:fillRef idx="1">
+              <a:schemeClr val="dk1"/>
+            </a:fillRef>
+            <a:effectRef idx="0">
+              <a:schemeClr val="dk1"/>
+            </a:effectRef>
+            <a:fontRef idx="minor">
+              <a:schemeClr val="lt1"/>
+            </a:fontRef>
+          </p:style>
+          <p:txBody>
+            <a:bodyPr rtlCol="0" anchor="ctr"/>
+            <a:lstStyle/>
+            <a:p>
+              <a:pPr algn="ctr"/>
+              <a:endParaRPr kumimoji="1" lang="ja-JP" altLang="en-US"/>
+            </a:p>
+          </p:txBody>
+        </p:sp>
+        <p:sp>
+          <p:nvSpPr>
+            <p:cNvPr id="8" name="正方形/長方形 7"/>
+            <p:cNvSpPr/>
+            <p:nvPr/>
+          </p:nvSpPr>
+          <p:spPr>
+            <a:xfrm>
+              <a:off x="2171613" y="3401626"/>
+              <a:ext cx="233572" cy="233588"/>
+            </a:xfrm>
+            <a:prstGeom prst="rect">
+              <a:avLst/>
+            </a:prstGeom>
+          </p:spPr>
+          <p:style>
+            <a:lnRef idx="2">
+              <a:schemeClr val="dk1">
+                <a:shade val="50000"/>
+              </a:schemeClr>
+            </a:lnRef>
+            <a:fillRef idx="1">
+              <a:schemeClr val="dk1"/>
+            </a:fillRef>
+            <a:effectRef idx="0">
+              <a:schemeClr val="dk1"/>
+            </a:effectRef>
+            <a:fontRef idx="minor">
+              <a:schemeClr val="lt1"/>
+            </a:fontRef>
+          </p:style>
+          <p:txBody>
+            <a:bodyPr rtlCol="0" anchor="ctr"/>
+            <a:lstStyle/>
+            <a:p>
+              <a:pPr algn="ctr"/>
+              <a:endParaRPr kumimoji="1" lang="ja-JP" altLang="en-US"/>
+            </a:p>
+          </p:txBody>
+        </p:sp>
+        <p:sp>
+          <p:nvSpPr>
+            <p:cNvPr id="9" name="正方形/長方形 8"/>
+            <p:cNvSpPr/>
+            <p:nvPr/>
+          </p:nvSpPr>
+          <p:spPr>
+            <a:xfrm>
+              <a:off x="2557585" y="3401626"/>
+              <a:ext cx="233572" cy="233588"/>
+            </a:xfrm>
+            <a:prstGeom prst="rect">
+              <a:avLst/>
+            </a:prstGeom>
+          </p:spPr>
+          <p:style>
+            <a:lnRef idx="2">
+              <a:schemeClr val="dk1">
+                <a:shade val="50000"/>
+              </a:schemeClr>
+            </a:lnRef>
+            <a:fillRef idx="1">
+              <a:schemeClr val="dk1"/>
+            </a:fillRef>
+            <a:effectRef idx="0">
+              <a:schemeClr val="dk1"/>
+            </a:effectRef>
+            <a:fontRef idx="minor">
+              <a:schemeClr val="lt1"/>
+            </a:fontRef>
+          </p:style>
+          <p:txBody>
+            <a:bodyPr rtlCol="0" anchor="ctr"/>
+            <a:lstStyle/>
+            <a:p>
+              <a:pPr algn="ctr"/>
+              <a:endParaRPr kumimoji="1" lang="ja-JP" altLang="en-US"/>
+            </a:p>
+          </p:txBody>
+        </p:sp>
+      </p:grpSp>
+      <p:grpSp>
+        <p:nvGrpSpPr>
+          <p:cNvPr id="11" name="図形グループ 10"/>
+          <p:cNvGrpSpPr/>
+          <p:nvPr/>
+        </p:nvGrpSpPr>
+        <p:grpSpPr>
+          <a:xfrm>
+            <a:off x="3670585" y="3255633"/>
+            <a:ext cx="2218939" cy="540173"/>
+            <a:chOff x="802906" y="3255633"/>
+            <a:chExt cx="2218939" cy="540173"/>
+          </a:xfrm>
+        </p:grpSpPr>
+        <p:sp>
+          <p:nvSpPr>
+            <p:cNvPr id="12" name="角丸四角形 11"/>
+            <p:cNvSpPr/>
+            <p:nvPr/>
+          </p:nvSpPr>
+          <p:spPr>
+            <a:xfrm>
+              <a:off x="802906" y="3255633"/>
+              <a:ext cx="2218939" cy="540173"/>
+            </a:xfrm>
+            <a:prstGeom prst="roundRect">
+              <a:avLst/>
+            </a:prstGeom>
+          </p:spPr>
+          <p:style>
+            <a:lnRef idx="1">
+              <a:schemeClr val="accent1"/>
+            </a:lnRef>
+            <a:fillRef idx="3">
+              <a:schemeClr val="accent1"/>
+            </a:fillRef>
+            <a:effectRef idx="2">
+              <a:schemeClr val="accent1"/>
+            </a:effectRef>
+            <a:fontRef idx="minor">
+              <a:schemeClr val="lt1"/>
+            </a:fontRef>
+          </p:style>
+          <p:txBody>
+            <a:bodyPr rtlCol="0" anchor="ctr"/>
+            <a:lstStyle/>
+            <a:p>
+              <a:pPr algn="ctr"/>
+              <a:endParaRPr kumimoji="1" lang="ja-JP" altLang="en-US"/>
+            </a:p>
+          </p:txBody>
+        </p:sp>
+        <p:sp>
+          <p:nvSpPr>
+            <p:cNvPr id="13" name="正方形/長方形 12"/>
+            <p:cNvSpPr/>
+            <p:nvPr/>
+          </p:nvSpPr>
+          <p:spPr>
+            <a:xfrm>
+              <a:off x="1007281" y="3401626"/>
+              <a:ext cx="233572" cy="233588"/>
+            </a:xfrm>
+            <a:prstGeom prst="rect">
+              <a:avLst/>
+            </a:prstGeom>
+          </p:spPr>
+          <p:style>
+            <a:lnRef idx="2">
+              <a:schemeClr val="dk1">
+                <a:shade val="50000"/>
+              </a:schemeClr>
+            </a:lnRef>
+            <a:fillRef idx="1">
+              <a:schemeClr val="dk1"/>
+            </a:fillRef>
+            <a:effectRef idx="0">
+              <a:schemeClr val="dk1"/>
+            </a:effectRef>
+            <a:fontRef idx="minor">
+              <a:schemeClr val="lt1"/>
+            </a:fontRef>
+          </p:style>
+          <p:txBody>
+            <a:bodyPr rtlCol="0" anchor="ctr"/>
+            <a:lstStyle/>
+            <a:p>
+              <a:pPr algn="ctr"/>
+              <a:endParaRPr kumimoji="1" lang="ja-JP" altLang="en-US"/>
+            </a:p>
+          </p:txBody>
+        </p:sp>
+        <p:sp>
+          <p:nvSpPr>
+            <p:cNvPr id="14" name="正方形/長方形 13"/>
+            <p:cNvSpPr/>
+            <p:nvPr/>
+          </p:nvSpPr>
+          <p:spPr>
+            <a:xfrm>
+              <a:off x="1393253" y="3401626"/>
+              <a:ext cx="233572" cy="233588"/>
+            </a:xfrm>
+            <a:prstGeom prst="rect">
+              <a:avLst/>
+            </a:prstGeom>
+          </p:spPr>
+          <p:style>
+            <a:lnRef idx="2">
+              <a:schemeClr val="dk1">
+                <a:shade val="50000"/>
+              </a:schemeClr>
+            </a:lnRef>
+            <a:fillRef idx="1">
+              <a:schemeClr val="dk1"/>
+            </a:fillRef>
+            <a:effectRef idx="0">
+              <a:schemeClr val="dk1"/>
+            </a:effectRef>
+            <a:fontRef idx="minor">
+              <a:schemeClr val="lt1"/>
+            </a:fontRef>
+          </p:style>
+          <p:txBody>
+            <a:bodyPr rtlCol="0" anchor="ctr"/>
+            <a:lstStyle/>
+            <a:p>
+              <a:pPr algn="ctr"/>
+              <a:endParaRPr kumimoji="1" lang="ja-JP" altLang="en-US"/>
+            </a:p>
+          </p:txBody>
+        </p:sp>
+        <p:sp>
+          <p:nvSpPr>
+            <p:cNvPr id="15" name="正方形/長方形 14"/>
+            <p:cNvSpPr/>
+            <p:nvPr/>
+          </p:nvSpPr>
+          <p:spPr>
+            <a:xfrm>
+              <a:off x="1785641" y="3401626"/>
+              <a:ext cx="233572" cy="233588"/>
+            </a:xfrm>
+            <a:prstGeom prst="rect">
+              <a:avLst/>
+            </a:prstGeom>
+          </p:spPr>
+          <p:style>
+            <a:lnRef idx="2">
+              <a:schemeClr val="dk1">
+                <a:shade val="50000"/>
+              </a:schemeClr>
+            </a:lnRef>
+            <a:fillRef idx="1">
+              <a:schemeClr val="dk1"/>
+            </a:fillRef>
+            <a:effectRef idx="0">
+              <a:schemeClr val="dk1"/>
+            </a:effectRef>
+            <a:fontRef idx="minor">
+              <a:schemeClr val="lt1"/>
+            </a:fontRef>
+          </p:style>
+          <p:txBody>
+            <a:bodyPr rtlCol="0" anchor="ctr"/>
+            <a:lstStyle/>
+            <a:p>
+              <a:pPr algn="ctr"/>
+              <a:endParaRPr kumimoji="1" lang="ja-JP" altLang="en-US"/>
+            </a:p>
+          </p:txBody>
+        </p:sp>
+        <p:sp>
+          <p:nvSpPr>
+            <p:cNvPr id="16" name="正方形/長方形 15"/>
+            <p:cNvSpPr/>
+            <p:nvPr/>
+          </p:nvSpPr>
+          <p:spPr>
+            <a:xfrm>
+              <a:off x="2171613" y="3401626"/>
+              <a:ext cx="233572" cy="233588"/>
+            </a:xfrm>
+            <a:prstGeom prst="rect">
+              <a:avLst/>
+            </a:prstGeom>
+          </p:spPr>
+          <p:style>
+            <a:lnRef idx="2">
+              <a:schemeClr val="dk1">
+                <a:shade val="50000"/>
+              </a:schemeClr>
+            </a:lnRef>
+            <a:fillRef idx="1">
+              <a:schemeClr val="dk1"/>
+            </a:fillRef>
+            <a:effectRef idx="0">
+              <a:schemeClr val="dk1"/>
+            </a:effectRef>
+            <a:fontRef idx="minor">
+              <a:schemeClr val="lt1"/>
+            </a:fontRef>
+          </p:style>
+          <p:txBody>
+            <a:bodyPr rtlCol="0" anchor="ctr"/>
+            <a:lstStyle/>
+            <a:p>
+              <a:pPr algn="ctr"/>
+              <a:endParaRPr kumimoji="1" lang="ja-JP" altLang="en-US"/>
+            </a:p>
+          </p:txBody>
+        </p:sp>
+        <p:sp>
+          <p:nvSpPr>
+            <p:cNvPr id="17" name="正方形/長方形 16"/>
+            <p:cNvSpPr/>
+            <p:nvPr/>
+          </p:nvSpPr>
+          <p:spPr>
+            <a:xfrm>
+              <a:off x="2557585" y="3401626"/>
+              <a:ext cx="233572" cy="233588"/>
+            </a:xfrm>
+            <a:prstGeom prst="rect">
+              <a:avLst/>
+            </a:prstGeom>
+          </p:spPr>
+          <p:style>
+            <a:lnRef idx="2">
+              <a:schemeClr val="dk1">
+                <a:shade val="50000"/>
+              </a:schemeClr>
+            </a:lnRef>
+            <a:fillRef idx="1">
+              <a:schemeClr val="dk1"/>
+            </a:fillRef>
+            <a:effectRef idx="0">
+              <a:schemeClr val="dk1"/>
+            </a:effectRef>
+            <a:fontRef idx="minor">
+              <a:schemeClr val="lt1"/>
+            </a:fontRef>
+          </p:style>
+          <p:txBody>
+            <a:bodyPr rtlCol="0" anchor="ctr"/>
+            <a:lstStyle/>
+            <a:p>
+              <a:pPr algn="ctr"/>
+              <a:endParaRPr kumimoji="1" lang="ja-JP" altLang="en-US"/>
+            </a:p>
+          </p:txBody>
+        </p:sp>
+      </p:grpSp>
+      <p:grpSp>
+        <p:nvGrpSpPr>
+          <p:cNvPr id="18" name="図形グループ 17"/>
+          <p:cNvGrpSpPr/>
+          <p:nvPr/>
+        </p:nvGrpSpPr>
+        <p:grpSpPr>
+          <a:xfrm>
+            <a:off x="2189093" y="4780363"/>
+            <a:ext cx="2218939" cy="540173"/>
+            <a:chOff x="861298" y="3255633"/>
+            <a:chExt cx="2218939" cy="540173"/>
+          </a:xfrm>
+        </p:grpSpPr>
+        <p:sp>
+          <p:nvSpPr>
+            <p:cNvPr id="19" name="角丸四角形 18"/>
+            <p:cNvSpPr/>
+            <p:nvPr/>
+          </p:nvSpPr>
+          <p:spPr>
+            <a:xfrm>
+              <a:off x="861298" y="3255633"/>
+              <a:ext cx="2218939" cy="540173"/>
+            </a:xfrm>
+            <a:prstGeom prst="roundRect">
+              <a:avLst/>
+            </a:prstGeom>
+          </p:spPr>
+          <p:style>
+            <a:lnRef idx="1">
+              <a:schemeClr val="accent1"/>
+            </a:lnRef>
+            <a:fillRef idx="3">
+              <a:schemeClr val="accent1"/>
+            </a:fillRef>
+            <a:effectRef idx="2">
+              <a:schemeClr val="accent1"/>
+            </a:effectRef>
+            <a:fontRef idx="minor">
+              <a:schemeClr val="lt1"/>
+            </a:fontRef>
+          </p:style>
+          <p:txBody>
+            <a:bodyPr rtlCol="0" anchor="ctr"/>
+            <a:lstStyle/>
+            <a:p>
+              <a:pPr algn="ctr"/>
+              <a:endParaRPr kumimoji="1" lang="ja-JP" altLang="en-US"/>
+            </a:p>
+          </p:txBody>
+        </p:sp>
+        <p:sp>
+          <p:nvSpPr>
+            <p:cNvPr id="20" name="正方形/長方形 19"/>
+            <p:cNvSpPr/>
+            <p:nvPr/>
+          </p:nvSpPr>
+          <p:spPr>
+            <a:xfrm>
+              <a:off x="1007281" y="3401626"/>
+              <a:ext cx="233572" cy="233588"/>
+            </a:xfrm>
+            <a:prstGeom prst="rect">
+              <a:avLst/>
+            </a:prstGeom>
+          </p:spPr>
+          <p:style>
+            <a:lnRef idx="2">
+              <a:schemeClr val="dk1">
+                <a:shade val="50000"/>
+              </a:schemeClr>
+            </a:lnRef>
+            <a:fillRef idx="1">
+              <a:schemeClr val="dk1"/>
+            </a:fillRef>
+            <a:effectRef idx="0">
+              <a:schemeClr val="dk1"/>
+            </a:effectRef>
+            <a:fontRef idx="minor">
+              <a:schemeClr val="lt1"/>
+            </a:fontRef>
+          </p:style>
+          <p:txBody>
+            <a:bodyPr rtlCol="0" anchor="ctr"/>
+            <a:lstStyle/>
+            <a:p>
+              <a:pPr algn="ctr"/>
+              <a:endParaRPr kumimoji="1" lang="ja-JP" altLang="en-US"/>
+            </a:p>
+          </p:txBody>
+        </p:sp>
+        <p:sp>
+          <p:nvSpPr>
+            <p:cNvPr id="21" name="正方形/長方形 20"/>
+            <p:cNvSpPr/>
+            <p:nvPr/>
+          </p:nvSpPr>
+          <p:spPr>
+            <a:xfrm>
+              <a:off x="1393253" y="3401626"/>
+              <a:ext cx="233572" cy="233588"/>
+            </a:xfrm>
+            <a:prstGeom prst="rect">
+              <a:avLst/>
+            </a:prstGeom>
+          </p:spPr>
+          <p:style>
+            <a:lnRef idx="2">
+              <a:schemeClr val="dk1">
+                <a:shade val="50000"/>
+              </a:schemeClr>
+            </a:lnRef>
+            <a:fillRef idx="1">
+              <a:schemeClr val="dk1"/>
+            </a:fillRef>
+            <a:effectRef idx="0">
+              <a:schemeClr val="dk1"/>
+            </a:effectRef>
+            <a:fontRef idx="minor">
+              <a:schemeClr val="lt1"/>
+            </a:fontRef>
+          </p:style>
+          <p:txBody>
+            <a:bodyPr rtlCol="0" anchor="ctr"/>
+            <a:lstStyle/>
+            <a:p>
+              <a:pPr algn="ctr"/>
+              <a:endParaRPr kumimoji="1" lang="ja-JP" altLang="en-US"/>
+            </a:p>
+          </p:txBody>
+        </p:sp>
+        <p:sp>
+          <p:nvSpPr>
+            <p:cNvPr id="22" name="正方形/長方形 21"/>
+            <p:cNvSpPr/>
+            <p:nvPr/>
+          </p:nvSpPr>
+          <p:spPr>
+            <a:xfrm>
+              <a:off x="1785641" y="3401626"/>
+              <a:ext cx="233572" cy="233588"/>
+            </a:xfrm>
+            <a:prstGeom prst="rect">
+              <a:avLst/>
+            </a:prstGeom>
+          </p:spPr>
+          <p:style>
+            <a:lnRef idx="2">
+              <a:schemeClr val="dk1">
+                <a:shade val="50000"/>
+              </a:schemeClr>
+            </a:lnRef>
+            <a:fillRef idx="1">
+              <a:schemeClr val="dk1"/>
+            </a:fillRef>
+            <a:effectRef idx="0">
+              <a:schemeClr val="dk1"/>
+            </a:effectRef>
+            <a:fontRef idx="minor">
+              <a:schemeClr val="lt1"/>
+            </a:fontRef>
+          </p:style>
+          <p:txBody>
+            <a:bodyPr rtlCol="0" anchor="ctr"/>
+            <a:lstStyle/>
+            <a:p>
+              <a:pPr algn="ctr"/>
+              <a:endParaRPr kumimoji="1" lang="ja-JP" altLang="en-US"/>
+            </a:p>
+          </p:txBody>
+        </p:sp>
+        <p:sp>
+          <p:nvSpPr>
+            <p:cNvPr id="23" name="正方形/長方形 22"/>
+            <p:cNvSpPr/>
+            <p:nvPr/>
+          </p:nvSpPr>
+          <p:spPr>
+            <a:xfrm>
+              <a:off x="2171613" y="3401626"/>
+              <a:ext cx="233572" cy="233588"/>
+            </a:xfrm>
+            <a:prstGeom prst="rect">
+              <a:avLst/>
+            </a:prstGeom>
+          </p:spPr>
+          <p:style>
+            <a:lnRef idx="2">
+              <a:schemeClr val="dk1">
+                <a:shade val="50000"/>
+              </a:schemeClr>
+            </a:lnRef>
+            <a:fillRef idx="1">
+              <a:schemeClr val="dk1"/>
+            </a:fillRef>
+            <a:effectRef idx="0">
+              <a:schemeClr val="dk1"/>
+            </a:effectRef>
+            <a:fontRef idx="minor">
+              <a:schemeClr val="lt1"/>
+            </a:fontRef>
+          </p:style>
+          <p:txBody>
+            <a:bodyPr rtlCol="0" anchor="ctr"/>
+            <a:lstStyle/>
+            <a:p>
+              <a:pPr algn="ctr"/>
+              <a:endParaRPr kumimoji="1" lang="ja-JP" altLang="en-US"/>
+            </a:p>
+          </p:txBody>
+        </p:sp>
+        <p:sp>
+          <p:nvSpPr>
+            <p:cNvPr id="24" name="正方形/長方形 23"/>
+            <p:cNvSpPr/>
+            <p:nvPr/>
+          </p:nvSpPr>
+          <p:spPr>
+            <a:xfrm>
+              <a:off x="2557585" y="3401626"/>
+              <a:ext cx="233572" cy="233588"/>
+            </a:xfrm>
+            <a:prstGeom prst="rect">
+              <a:avLst/>
+            </a:prstGeom>
+          </p:spPr>
+          <p:style>
+            <a:lnRef idx="2">
+              <a:schemeClr val="dk1">
+                <a:shade val="50000"/>
+              </a:schemeClr>
+            </a:lnRef>
+            <a:fillRef idx="1">
+              <a:schemeClr val="dk1"/>
+            </a:fillRef>
+            <a:effectRef idx="0">
+              <a:schemeClr val="dk1"/>
+            </a:effectRef>
+            <a:fontRef idx="minor">
+              <a:schemeClr val="lt1"/>
+            </a:fontRef>
+          </p:style>
+          <p:txBody>
+            <a:bodyPr rtlCol="0" anchor="ctr"/>
+            <a:lstStyle/>
+            <a:p>
+              <a:pPr algn="ctr"/>
+              <a:endParaRPr kumimoji="1" lang="ja-JP" altLang="en-US"/>
+            </a:p>
+          </p:txBody>
+        </p:sp>
+      </p:grpSp>
+      <p:grpSp>
+        <p:nvGrpSpPr>
+          <p:cNvPr id="29" name="図形グループ 28"/>
+          <p:cNvGrpSpPr/>
+          <p:nvPr/>
+        </p:nvGrpSpPr>
+        <p:grpSpPr>
+          <a:xfrm>
+            <a:off x="760233" y="1357731"/>
+            <a:ext cx="890496" cy="1328532"/>
+            <a:chOff x="7123962" y="1357731"/>
+            <a:chExt cx="890496" cy="1328532"/>
+          </a:xfrm>
+        </p:grpSpPr>
+        <p:sp>
+          <p:nvSpPr>
+            <p:cNvPr id="27" name="正方形/長方形 26"/>
+            <p:cNvSpPr/>
+            <p:nvPr/>
+          </p:nvSpPr>
+          <p:spPr>
+            <a:xfrm>
+              <a:off x="7123962" y="1357731"/>
+              <a:ext cx="890496" cy="1328532"/>
+            </a:xfrm>
+            <a:prstGeom prst="rect">
+              <a:avLst/>
+            </a:prstGeom>
+          </p:spPr>
+          <p:style>
+            <a:lnRef idx="1">
+              <a:schemeClr val="accent1"/>
+            </a:lnRef>
+            <a:fillRef idx="3">
+              <a:schemeClr val="accent1"/>
+            </a:fillRef>
+            <a:effectRef idx="2">
+              <a:schemeClr val="accent1"/>
+            </a:effectRef>
+            <a:fontRef idx="minor">
+              <a:schemeClr val="lt1"/>
+            </a:fontRef>
+          </p:style>
+          <p:txBody>
+            <a:bodyPr rtlCol="0" anchor="t"/>
+            <a:lstStyle/>
+            <a:p>
+              <a:pPr algn="ctr"/>
+              <a:r>
+                <a:rPr kumimoji="1" lang="ja-JP" altLang="en-US" dirty="0" smtClean="0"/>
+                <a:t>仮想</a:t>
+              </a:r>
+              <a:r>
+                <a:rPr kumimoji="1" lang="en-US" altLang="ja-JP" dirty="0" smtClean="0"/>
+                <a:t/>
+              </a:r>
+              <a:br>
+                <a:rPr kumimoji="1" lang="en-US" altLang="ja-JP" dirty="0" smtClean="0"/>
+              </a:br>
+              <a:r>
+                <a:rPr kumimoji="1" lang="ja-JP" altLang="en-US" dirty="0" smtClean="0"/>
+                <a:t>マシン</a:t>
+              </a:r>
+              <a:endParaRPr kumimoji="1" lang="en-US" altLang="ja-JP" dirty="0" smtClean="0"/>
+            </a:p>
+            <a:p>
+              <a:pPr algn="ctr"/>
+              <a:r>
+                <a:rPr kumimoji="1" lang="en-US" altLang="ja-JP" dirty="0" smtClean="0"/>
+                <a:t>1</a:t>
+              </a:r>
+              <a:endParaRPr kumimoji="1" lang="ja-JP" altLang="en-US" dirty="0"/>
+            </a:p>
+          </p:txBody>
+        </p:sp>
+        <p:sp>
+          <p:nvSpPr>
+            <p:cNvPr id="28" name="正方形/長方形 27"/>
+            <p:cNvSpPr/>
+            <p:nvPr/>
+          </p:nvSpPr>
+          <p:spPr>
+            <a:xfrm>
+              <a:off x="7446245" y="2423476"/>
+              <a:ext cx="233572" cy="233588"/>
+            </a:xfrm>
+            <a:prstGeom prst="rect">
+              <a:avLst/>
+            </a:prstGeom>
+          </p:spPr>
+          <p:style>
+            <a:lnRef idx="2">
+              <a:schemeClr val="dk1">
+                <a:shade val="50000"/>
+              </a:schemeClr>
+            </a:lnRef>
+            <a:fillRef idx="1">
+              <a:schemeClr val="dk1"/>
+            </a:fillRef>
+            <a:effectRef idx="0">
+              <a:schemeClr val="dk1"/>
+            </a:effectRef>
+            <a:fontRef idx="minor">
+              <a:schemeClr val="lt1"/>
+            </a:fontRef>
+          </p:style>
+          <p:txBody>
+            <a:bodyPr rtlCol="0" anchor="ctr"/>
+            <a:lstStyle/>
+            <a:p>
+              <a:pPr algn="ctr"/>
+              <a:endParaRPr kumimoji="1" lang="ja-JP" altLang="en-US"/>
+            </a:p>
+          </p:txBody>
+        </p:sp>
+      </p:grpSp>
+      <p:grpSp>
+        <p:nvGrpSpPr>
+          <p:cNvPr id="30" name="図形グループ 29"/>
+          <p:cNvGrpSpPr/>
+          <p:nvPr/>
+        </p:nvGrpSpPr>
+        <p:grpSpPr>
+          <a:xfrm>
+            <a:off x="2020981" y="1357731"/>
+            <a:ext cx="890496" cy="1328532"/>
+            <a:chOff x="7123962" y="1357731"/>
+            <a:chExt cx="890496" cy="1328532"/>
+          </a:xfrm>
+        </p:grpSpPr>
+        <p:sp>
+          <p:nvSpPr>
+            <p:cNvPr id="31" name="正方形/長方形 30"/>
+            <p:cNvSpPr/>
+            <p:nvPr/>
+          </p:nvSpPr>
+          <p:spPr>
+            <a:xfrm>
+              <a:off x="7123962" y="1357731"/>
+              <a:ext cx="890496" cy="1328532"/>
+            </a:xfrm>
+            <a:prstGeom prst="rect">
+              <a:avLst/>
+            </a:prstGeom>
+          </p:spPr>
+          <p:style>
+            <a:lnRef idx="1">
+              <a:schemeClr val="accent1"/>
+            </a:lnRef>
+            <a:fillRef idx="3">
+              <a:schemeClr val="accent1"/>
+            </a:fillRef>
+            <a:effectRef idx="2">
+              <a:schemeClr val="accent1"/>
+            </a:effectRef>
+            <a:fontRef idx="minor">
+              <a:schemeClr val="lt1"/>
+            </a:fontRef>
+          </p:style>
+          <p:txBody>
+            <a:bodyPr rtlCol="0" anchor="t"/>
+            <a:lstStyle/>
+            <a:p>
+              <a:pPr algn="ctr"/>
+              <a:r>
+                <a:rPr kumimoji="1" lang="ja-JP" altLang="en-US" dirty="0" smtClean="0"/>
+                <a:t>仮想</a:t>
+              </a:r>
+              <a:r>
+                <a:rPr kumimoji="1" lang="en-US" altLang="ja-JP" dirty="0" smtClean="0"/>
+                <a:t/>
+              </a:r>
+              <a:br>
+                <a:rPr kumimoji="1" lang="en-US" altLang="ja-JP" dirty="0" smtClean="0"/>
+              </a:br>
+              <a:r>
+                <a:rPr kumimoji="1" lang="ja-JP" altLang="en-US" dirty="0" smtClean="0"/>
+                <a:t>マシン</a:t>
+              </a:r>
+              <a:endParaRPr kumimoji="1" lang="en-US" altLang="ja-JP" dirty="0" smtClean="0"/>
+            </a:p>
+            <a:p>
+              <a:pPr algn="ctr"/>
+              <a:r>
+                <a:rPr lang="en-US" altLang="ja-JP" dirty="0"/>
+                <a:t>2</a:t>
+              </a:r>
+              <a:endParaRPr kumimoji="1" lang="ja-JP" altLang="en-US" dirty="0"/>
+            </a:p>
+          </p:txBody>
+        </p:sp>
+        <p:sp>
+          <p:nvSpPr>
+            <p:cNvPr id="32" name="正方形/長方形 31"/>
+            <p:cNvSpPr/>
+            <p:nvPr/>
+          </p:nvSpPr>
+          <p:spPr>
+            <a:xfrm>
+              <a:off x="7446245" y="2423476"/>
+              <a:ext cx="233572" cy="233588"/>
+            </a:xfrm>
+            <a:prstGeom prst="rect">
+              <a:avLst/>
+            </a:prstGeom>
+          </p:spPr>
+          <p:style>
+            <a:lnRef idx="2">
+              <a:schemeClr val="dk1">
+                <a:shade val="50000"/>
+              </a:schemeClr>
+            </a:lnRef>
+            <a:fillRef idx="1">
+              <a:schemeClr val="dk1"/>
+            </a:fillRef>
+            <a:effectRef idx="0">
+              <a:schemeClr val="dk1"/>
+            </a:effectRef>
+            <a:fontRef idx="minor">
+              <a:schemeClr val="lt1"/>
+            </a:fontRef>
+          </p:style>
+          <p:txBody>
+            <a:bodyPr rtlCol="0" anchor="ctr"/>
+            <a:lstStyle/>
+            <a:p>
+              <a:pPr algn="ctr"/>
+              <a:endParaRPr kumimoji="1" lang="ja-JP" altLang="en-US"/>
+            </a:p>
+          </p:txBody>
+        </p:sp>
+      </p:grpSp>
+      <p:grpSp>
+        <p:nvGrpSpPr>
+          <p:cNvPr id="33" name="図形グループ 32"/>
+          <p:cNvGrpSpPr/>
+          <p:nvPr/>
+        </p:nvGrpSpPr>
+        <p:grpSpPr>
+          <a:xfrm>
+            <a:off x="3719503" y="1357731"/>
+            <a:ext cx="890496" cy="1328532"/>
+            <a:chOff x="7123962" y="1357731"/>
+            <a:chExt cx="890496" cy="1328532"/>
+          </a:xfrm>
+        </p:grpSpPr>
+        <p:sp>
+          <p:nvSpPr>
+            <p:cNvPr id="34" name="正方形/長方形 33"/>
+            <p:cNvSpPr/>
+            <p:nvPr/>
+          </p:nvSpPr>
+          <p:spPr>
+            <a:xfrm>
+              <a:off x="7123962" y="1357731"/>
+              <a:ext cx="890496" cy="1328532"/>
+            </a:xfrm>
+            <a:prstGeom prst="rect">
+              <a:avLst/>
+            </a:prstGeom>
+          </p:spPr>
+          <p:style>
+            <a:lnRef idx="1">
+              <a:schemeClr val="accent1"/>
+            </a:lnRef>
+            <a:fillRef idx="3">
+              <a:schemeClr val="accent1"/>
+            </a:fillRef>
+            <a:effectRef idx="2">
+              <a:schemeClr val="accent1"/>
+            </a:effectRef>
+            <a:fontRef idx="minor">
+              <a:schemeClr val="lt1"/>
+            </a:fontRef>
+          </p:style>
+          <p:txBody>
+            <a:bodyPr rtlCol="0" anchor="t"/>
+            <a:lstStyle/>
+            <a:p>
+              <a:pPr algn="ctr"/>
+              <a:r>
+                <a:rPr kumimoji="1" lang="ja-JP" altLang="en-US" dirty="0" smtClean="0"/>
+                <a:t>仮想</a:t>
+              </a:r>
+              <a:r>
+                <a:rPr kumimoji="1" lang="en-US" altLang="ja-JP" dirty="0" smtClean="0"/>
+                <a:t/>
+              </a:r>
+              <a:br>
+                <a:rPr kumimoji="1" lang="en-US" altLang="ja-JP" dirty="0" smtClean="0"/>
+              </a:br>
+              <a:r>
+                <a:rPr kumimoji="1" lang="ja-JP" altLang="en-US" dirty="0" smtClean="0"/>
+                <a:t>マシン</a:t>
+              </a:r>
+              <a:endParaRPr kumimoji="1" lang="en-US" altLang="ja-JP" dirty="0" smtClean="0"/>
+            </a:p>
+            <a:p>
+              <a:pPr algn="ctr"/>
+              <a:r>
+                <a:rPr lang="en-US" altLang="ja-JP" dirty="0"/>
+                <a:t>3</a:t>
+              </a:r>
+              <a:endParaRPr kumimoji="1" lang="ja-JP" altLang="en-US" dirty="0"/>
+            </a:p>
+          </p:txBody>
+        </p:sp>
+        <p:sp>
+          <p:nvSpPr>
+            <p:cNvPr id="35" name="正方形/長方形 34"/>
+            <p:cNvSpPr/>
+            <p:nvPr/>
+          </p:nvSpPr>
+          <p:spPr>
+            <a:xfrm>
+              <a:off x="7446245" y="2423476"/>
+              <a:ext cx="233572" cy="233588"/>
+            </a:xfrm>
+            <a:prstGeom prst="rect">
+              <a:avLst/>
+            </a:prstGeom>
+          </p:spPr>
+          <p:style>
+            <a:lnRef idx="2">
+              <a:schemeClr val="dk1">
+                <a:shade val="50000"/>
+              </a:schemeClr>
+            </a:lnRef>
+            <a:fillRef idx="1">
+              <a:schemeClr val="dk1"/>
+            </a:fillRef>
+            <a:effectRef idx="0">
+              <a:schemeClr val="dk1"/>
+            </a:effectRef>
+            <a:fontRef idx="minor">
+              <a:schemeClr val="lt1"/>
+            </a:fontRef>
+          </p:style>
+          <p:txBody>
+            <a:bodyPr rtlCol="0" anchor="ctr"/>
+            <a:lstStyle/>
+            <a:p>
+              <a:pPr algn="ctr"/>
+              <a:endParaRPr kumimoji="1" lang="ja-JP" altLang="en-US"/>
+            </a:p>
+          </p:txBody>
+        </p:sp>
+      </p:grpSp>
+      <p:grpSp>
+        <p:nvGrpSpPr>
+          <p:cNvPr id="36" name="図形グループ 35"/>
+          <p:cNvGrpSpPr/>
+          <p:nvPr/>
+        </p:nvGrpSpPr>
+        <p:grpSpPr>
+          <a:xfrm>
+            <a:off x="4980251" y="1357731"/>
+            <a:ext cx="890496" cy="1328532"/>
+            <a:chOff x="7123962" y="1357731"/>
+            <a:chExt cx="890496" cy="1328532"/>
+          </a:xfrm>
+        </p:grpSpPr>
+        <p:sp>
+          <p:nvSpPr>
+            <p:cNvPr id="37" name="正方形/長方形 36"/>
+            <p:cNvSpPr/>
+            <p:nvPr/>
+          </p:nvSpPr>
+          <p:spPr>
+            <a:xfrm>
+              <a:off x="7123962" y="1357731"/>
+              <a:ext cx="890496" cy="1328532"/>
+            </a:xfrm>
+            <a:prstGeom prst="rect">
+              <a:avLst/>
+            </a:prstGeom>
+          </p:spPr>
+          <p:style>
+            <a:lnRef idx="1">
+              <a:schemeClr val="accent1"/>
+            </a:lnRef>
+            <a:fillRef idx="3">
+              <a:schemeClr val="accent1"/>
+            </a:fillRef>
+            <a:effectRef idx="2">
+              <a:schemeClr val="accent1"/>
+            </a:effectRef>
+            <a:fontRef idx="minor">
+              <a:schemeClr val="lt1"/>
+            </a:fontRef>
+          </p:style>
+          <p:txBody>
+            <a:bodyPr rtlCol="0" anchor="t"/>
+            <a:lstStyle/>
+            <a:p>
+              <a:pPr algn="ctr"/>
+              <a:r>
+                <a:rPr kumimoji="1" lang="ja-JP" altLang="en-US" dirty="0" smtClean="0"/>
+                <a:t>仮想</a:t>
+              </a:r>
+              <a:r>
+                <a:rPr kumimoji="1" lang="en-US" altLang="ja-JP" dirty="0" smtClean="0"/>
+                <a:t/>
+              </a:r>
+              <a:br>
+                <a:rPr kumimoji="1" lang="en-US" altLang="ja-JP" dirty="0" smtClean="0"/>
+              </a:br>
+              <a:r>
+                <a:rPr kumimoji="1" lang="ja-JP" altLang="en-US" dirty="0" smtClean="0"/>
+                <a:t>マシン</a:t>
+              </a:r>
+              <a:endParaRPr kumimoji="1" lang="en-US" altLang="ja-JP" dirty="0" smtClean="0"/>
+            </a:p>
+            <a:p>
+              <a:pPr algn="ctr"/>
+              <a:r>
+                <a:rPr lang="en-US" altLang="ja-JP" dirty="0"/>
+                <a:t>4</a:t>
+              </a:r>
+              <a:endParaRPr kumimoji="1" lang="ja-JP" altLang="en-US" dirty="0"/>
+            </a:p>
+          </p:txBody>
+        </p:sp>
+        <p:sp>
+          <p:nvSpPr>
+            <p:cNvPr id="38" name="正方形/長方形 37"/>
+            <p:cNvSpPr/>
+            <p:nvPr/>
+          </p:nvSpPr>
+          <p:spPr>
+            <a:xfrm>
+              <a:off x="7446245" y="2423476"/>
+              <a:ext cx="233572" cy="233588"/>
+            </a:xfrm>
+            <a:prstGeom prst="rect">
+              <a:avLst/>
+            </a:prstGeom>
+          </p:spPr>
+          <p:style>
+            <a:lnRef idx="2">
+              <a:schemeClr val="dk1">
+                <a:shade val="50000"/>
+              </a:schemeClr>
+            </a:lnRef>
+            <a:fillRef idx="1">
+              <a:schemeClr val="dk1"/>
+            </a:fillRef>
+            <a:effectRef idx="0">
+              <a:schemeClr val="dk1"/>
+            </a:effectRef>
+            <a:fontRef idx="minor">
+              <a:schemeClr val="lt1"/>
+            </a:fontRef>
+          </p:style>
+          <p:txBody>
+            <a:bodyPr rtlCol="0" anchor="ctr"/>
+            <a:lstStyle/>
+            <a:p>
+              <a:pPr algn="ctr"/>
+              <a:endParaRPr kumimoji="1" lang="ja-JP" altLang="en-US"/>
+            </a:p>
+          </p:txBody>
+        </p:sp>
+      </p:grpSp>
+      <p:cxnSp>
+        <p:nvCxnSpPr>
+          <p:cNvPr id="41" name="直線コネクタ 40"/>
+          <p:cNvCxnSpPr>
+            <a:stCxn id="28" idx="2"/>
+            <a:endCxn id="5" idx="0"/>
+          </p:cNvCxnSpPr>
+          <p:nvPr/>
+        </p:nvCxnSpPr>
+        <p:spPr>
+          <a:xfrm flipH="1">
+            <a:off x="1051077" y="2657064"/>
+            <a:ext cx="148225" cy="744562"/>
+          </a:xfrm>
+          <a:prstGeom prst="line">
+            <a:avLst/>
+          </a:prstGeom>
+        </p:spPr>
+        <p:style>
+          <a:lnRef idx="3">
+            <a:schemeClr val="dk1"/>
+          </a:lnRef>
+          <a:fillRef idx="0">
+            <a:schemeClr val="dk1"/>
+          </a:fillRef>
+          <a:effectRef idx="2">
+            <a:schemeClr val="dk1"/>
+          </a:effectRef>
+          <a:fontRef idx="minor">
+            <a:schemeClr val="tx1"/>
+          </a:fontRef>
+        </p:style>
+      </p:cxnSp>
+      <p:cxnSp>
+        <p:nvCxnSpPr>
+          <p:cNvPr id="42" name="直線コネクタ 41"/>
+          <p:cNvCxnSpPr>
+            <a:stCxn id="32" idx="2"/>
+            <a:endCxn id="7" idx="0"/>
+          </p:cNvCxnSpPr>
+          <p:nvPr/>
+        </p:nvCxnSpPr>
+        <p:spPr>
+          <a:xfrm flipH="1">
+            <a:off x="1829437" y="2657064"/>
+            <a:ext cx="630613" cy="744562"/>
+          </a:xfrm>
+          <a:prstGeom prst="line">
+            <a:avLst/>
+          </a:prstGeom>
+        </p:spPr>
+        <p:style>
+          <a:lnRef idx="3">
+            <a:schemeClr val="dk1"/>
+          </a:lnRef>
+          <a:fillRef idx="0">
+            <a:schemeClr val="dk1"/>
+          </a:fillRef>
+          <a:effectRef idx="2">
+            <a:schemeClr val="dk1"/>
+          </a:effectRef>
+          <a:fontRef idx="minor">
+            <a:schemeClr val="tx1"/>
+          </a:fontRef>
+        </p:style>
+      </p:cxnSp>
+      <p:cxnSp>
+        <p:nvCxnSpPr>
+          <p:cNvPr id="47" name="直線コネクタ 46"/>
+          <p:cNvCxnSpPr>
+            <a:stCxn id="35" idx="2"/>
+            <a:endCxn id="13" idx="0"/>
+          </p:cNvCxnSpPr>
+          <p:nvPr/>
+        </p:nvCxnSpPr>
+        <p:spPr>
+          <a:xfrm flipH="1">
+            <a:off x="3991746" y="2657064"/>
+            <a:ext cx="166826" cy="744562"/>
+          </a:xfrm>
+          <a:prstGeom prst="line">
+            <a:avLst/>
+          </a:prstGeom>
+        </p:spPr>
+        <p:style>
+          <a:lnRef idx="3">
+            <a:schemeClr val="dk1"/>
+          </a:lnRef>
+          <a:fillRef idx="0">
+            <a:schemeClr val="dk1"/>
+          </a:fillRef>
+          <a:effectRef idx="2">
+            <a:schemeClr val="dk1"/>
+          </a:effectRef>
+          <a:fontRef idx="minor">
+            <a:schemeClr val="tx1"/>
+          </a:fontRef>
+        </p:style>
+      </p:cxnSp>
+      <p:cxnSp>
+        <p:nvCxnSpPr>
+          <p:cNvPr id="48" name="直線コネクタ 47"/>
+          <p:cNvCxnSpPr>
+            <a:stCxn id="38" idx="2"/>
+            <a:endCxn id="15" idx="0"/>
+          </p:cNvCxnSpPr>
+          <p:nvPr/>
+        </p:nvCxnSpPr>
+        <p:spPr>
+          <a:xfrm flipH="1">
+            <a:off x="4770106" y="2657064"/>
+            <a:ext cx="649214" cy="744562"/>
+          </a:xfrm>
+          <a:prstGeom prst="line">
+            <a:avLst/>
+          </a:prstGeom>
+        </p:spPr>
+        <p:style>
+          <a:lnRef idx="3">
+            <a:schemeClr val="dk1"/>
+          </a:lnRef>
+          <a:fillRef idx="0">
+            <a:schemeClr val="dk1"/>
+          </a:fillRef>
+          <a:effectRef idx="2">
+            <a:schemeClr val="dk1"/>
+          </a:effectRef>
+          <a:fontRef idx="minor">
+            <a:schemeClr val="tx1"/>
+          </a:fontRef>
+        </p:style>
+      </p:cxnSp>
+      <p:cxnSp>
+        <p:nvCxnSpPr>
+          <p:cNvPr id="53" name="直線コネクタ 52"/>
+          <p:cNvCxnSpPr>
+            <a:stCxn id="9" idx="2"/>
+            <a:endCxn id="21" idx="0"/>
+          </p:cNvCxnSpPr>
+          <p:nvPr/>
+        </p:nvCxnSpPr>
+        <p:spPr>
+          <a:xfrm>
+            <a:off x="2601381" y="3635214"/>
+            <a:ext cx="236453" cy="1291142"/>
+          </a:xfrm>
+          <a:prstGeom prst="line">
+            <a:avLst/>
+          </a:prstGeom>
+        </p:spPr>
+        <p:style>
+          <a:lnRef idx="3">
+            <a:schemeClr val="dk1"/>
+          </a:lnRef>
+          <a:fillRef idx="0">
+            <a:schemeClr val="dk1"/>
+          </a:fillRef>
+          <a:effectRef idx="2">
+            <a:schemeClr val="dk1"/>
+          </a:effectRef>
+          <a:fontRef idx="minor">
+            <a:schemeClr val="tx1"/>
+          </a:fontRef>
+        </p:style>
+      </p:cxnSp>
+      <p:cxnSp>
+        <p:nvCxnSpPr>
+          <p:cNvPr id="54" name="直線コネクタ 53"/>
+          <p:cNvCxnSpPr>
+            <a:stCxn id="17" idx="2"/>
+            <a:endCxn id="23" idx="0"/>
+          </p:cNvCxnSpPr>
+          <p:nvPr/>
+        </p:nvCxnSpPr>
+        <p:spPr>
+          <a:xfrm flipH="1">
+            <a:off x="3616194" y="3635214"/>
+            <a:ext cx="1925856" cy="1291142"/>
+          </a:xfrm>
+          <a:prstGeom prst="line">
+            <a:avLst/>
+          </a:prstGeom>
+        </p:spPr>
+        <p:style>
+          <a:lnRef idx="3">
+            <a:schemeClr val="dk1"/>
+          </a:lnRef>
+          <a:fillRef idx="0">
+            <a:schemeClr val="dk1"/>
+          </a:fillRef>
+          <a:effectRef idx="2">
+            <a:schemeClr val="dk1"/>
+          </a:effectRef>
+          <a:fontRef idx="minor">
+            <a:schemeClr val="tx1"/>
+          </a:fontRef>
+        </p:style>
+      </p:cxnSp>
+      <p:sp>
+        <p:nvSpPr>
+          <p:cNvPr id="39" name="角丸四角形 38"/>
+          <p:cNvSpPr/>
+          <p:nvPr/>
+        </p:nvSpPr>
+        <p:spPr>
+          <a:xfrm>
+            <a:off x="558093" y="896961"/>
+            <a:ext cx="4183284" cy="2014697"/>
+          </a:xfrm>
+          <a:prstGeom prst="roundRect">
+            <a:avLst/>
+          </a:prstGeom>
+          <a:solidFill>
+            <a:srgbClr val="FFFFFF">
+              <a:alpha val="50000"/>
+            </a:srgbClr>
+          </a:solidFill>
+          <a:effectLst/>
+        </p:spPr>
+        <p:style>
+          <a:lnRef idx="1">
+            <a:schemeClr val="accent1"/>
+          </a:lnRef>
+          <a:fillRef idx="3">
+            <a:schemeClr val="accent1"/>
+          </a:fillRef>
+          <a:effectRef idx="2">
+            <a:schemeClr val="accent1"/>
+          </a:effectRef>
+          <a:fontRef idx="minor">
+            <a:schemeClr val="lt1"/>
+          </a:fontRef>
+        </p:style>
+        <p:txBody>
+          <a:bodyPr rtlCol="0" anchor="t"/>
+          <a:lstStyle/>
+          <a:p>
+            <a:pPr algn="ctr"/>
+            <a:r>
+              <a:rPr kumimoji="1" lang="ja-JP" altLang="en-US" b="1" dirty="0" smtClean="0">
+                <a:solidFill>
+                  <a:srgbClr val="FF0000"/>
+                </a:solidFill>
+              </a:rPr>
+              <a:t>セキュリティグループ</a:t>
+            </a:r>
+            <a:r>
+              <a:rPr lang="en-US" altLang="ja-JP" b="1" dirty="0" smtClean="0">
+                <a:solidFill>
+                  <a:srgbClr val="FF0000"/>
+                </a:solidFill>
+              </a:rPr>
+              <a:t>A</a:t>
+            </a:r>
+            <a:endParaRPr kumimoji="1" lang="ja-JP" altLang="en-US" b="1" dirty="0">
+              <a:solidFill>
+                <a:srgbClr val="FF0000"/>
+              </a:solidFill>
+            </a:endParaRPr>
+          </a:p>
+        </p:txBody>
+      </p:sp>
+      <p:sp>
+        <p:nvSpPr>
+          <p:cNvPr id="49" name="角丸四角形 48"/>
+          <p:cNvSpPr/>
+          <p:nvPr/>
+        </p:nvSpPr>
+        <p:spPr>
+          <a:xfrm>
+            <a:off x="4852398" y="896961"/>
+            <a:ext cx="1205890" cy="2014697"/>
+          </a:xfrm>
+          <a:prstGeom prst="roundRect">
+            <a:avLst/>
+          </a:prstGeom>
+          <a:solidFill>
+            <a:srgbClr val="FFFFFF">
+              <a:alpha val="50000"/>
+            </a:srgbClr>
+          </a:solidFill>
+          <a:effectLst/>
+        </p:spPr>
+        <p:style>
+          <a:lnRef idx="1">
+            <a:schemeClr val="accent1"/>
+          </a:lnRef>
+          <a:fillRef idx="3">
+            <a:schemeClr val="accent1"/>
+          </a:fillRef>
+          <a:effectRef idx="2">
+            <a:schemeClr val="accent1"/>
+          </a:effectRef>
+          <a:fontRef idx="minor">
+            <a:schemeClr val="lt1"/>
+          </a:fontRef>
+        </p:style>
+        <p:txBody>
+          <a:bodyPr rtlCol="0" anchor="t"/>
+          <a:lstStyle/>
+          <a:p>
+            <a:pPr algn="ctr"/>
+            <a:r>
+              <a:rPr kumimoji="1" lang="ja-JP" altLang="en-US" b="1" dirty="0" smtClean="0">
+                <a:solidFill>
+                  <a:srgbClr val="FF0000"/>
+                </a:solidFill>
+              </a:rPr>
+              <a:t>セキュリティグループ</a:t>
+            </a:r>
+            <a:r>
+              <a:rPr kumimoji="1" lang="en-US" altLang="ja-JP" b="1" dirty="0" smtClean="0">
+                <a:solidFill>
+                  <a:srgbClr val="FF0000"/>
+                </a:solidFill>
+              </a:rPr>
+              <a:t>B</a:t>
+            </a:r>
+            <a:endParaRPr kumimoji="1" lang="ja-JP" altLang="en-US" b="1" dirty="0">
+              <a:solidFill>
+                <a:srgbClr val="FF0000"/>
+              </a:solidFill>
+            </a:endParaRPr>
+          </a:p>
+        </p:txBody>
+      </p:sp>
+      <p:sp>
+        <p:nvSpPr>
+          <p:cNvPr id="45" name="雲 44"/>
+          <p:cNvSpPr/>
+          <p:nvPr/>
+        </p:nvSpPr>
+        <p:spPr>
+          <a:xfrm>
+            <a:off x="102195" y="4438174"/>
+            <a:ext cx="1844028" cy="1211738"/>
+          </a:xfrm>
+          <a:prstGeom prst="cloud">
+            <a:avLst/>
+          </a:prstGeom>
+        </p:spPr>
+        <p:style>
+          <a:lnRef idx="1">
+            <a:schemeClr val="accent1"/>
+          </a:lnRef>
+          <a:fillRef idx="3">
+            <a:schemeClr val="accent1"/>
+          </a:fillRef>
+          <a:effectRef idx="2">
+            <a:schemeClr val="accent1"/>
+          </a:effectRef>
+          <a:fontRef idx="minor">
+            <a:schemeClr val="lt1"/>
+          </a:fontRef>
+        </p:style>
+        <p:txBody>
+          <a:bodyPr wrap="none" rtlCol="0" anchor="ctr"/>
+          <a:lstStyle/>
+          <a:p>
+            <a:pPr algn="ctr"/>
+            <a:r>
+              <a:rPr kumimoji="1" lang="ja-JP" altLang="en-US" dirty="0" smtClean="0"/>
+              <a:t>インターネット</a:t>
+            </a:r>
+            <a:endParaRPr kumimoji="1" lang="ja-JP" altLang="en-US" dirty="0"/>
+          </a:p>
+        </p:txBody>
+      </p:sp>
+      <p:cxnSp>
+        <p:nvCxnSpPr>
+          <p:cNvPr id="52" name="直線コネクタ 51"/>
+          <p:cNvCxnSpPr>
+            <a:stCxn id="20" idx="1"/>
+            <a:endCxn id="45" idx="0"/>
+          </p:cNvCxnSpPr>
+          <p:nvPr/>
+        </p:nvCxnSpPr>
+        <p:spPr>
+          <a:xfrm flipH="1">
+            <a:off x="1944686" y="5043150"/>
+            <a:ext cx="390390" cy="893"/>
+          </a:xfrm>
+          <a:prstGeom prst="line">
+            <a:avLst/>
+          </a:prstGeom>
+        </p:spPr>
+        <p:style>
+          <a:lnRef idx="3">
+            <a:schemeClr val="dk1"/>
+          </a:lnRef>
+          <a:fillRef idx="0">
+            <a:schemeClr val="dk1"/>
+          </a:fillRef>
+          <a:effectRef idx="2">
+            <a:schemeClr val="dk1"/>
+          </a:effectRef>
+          <a:fontRef idx="minor">
+            <a:schemeClr val="tx1"/>
+          </a:fontRef>
+        </p:style>
+      </p:cxnSp>
+      <p:sp>
+        <p:nvSpPr>
+          <p:cNvPr id="56" name="角丸四角形 55"/>
+          <p:cNvSpPr/>
+          <p:nvPr/>
+        </p:nvSpPr>
+        <p:spPr>
+          <a:xfrm>
+            <a:off x="558093" y="3036645"/>
+            <a:ext cx="5500195" cy="364981"/>
+          </a:xfrm>
+          <a:prstGeom prst="roundRect">
+            <a:avLst/>
+          </a:prstGeom>
+          <a:solidFill>
+            <a:srgbClr val="FFFF00">
+              <a:alpha val="50000"/>
+            </a:srgbClr>
+          </a:solidFill>
+          <a:effectLst/>
+        </p:spPr>
+        <p:style>
+          <a:lnRef idx="1">
+            <a:schemeClr val="accent1"/>
+          </a:lnRef>
+          <a:fillRef idx="3">
+            <a:schemeClr val="accent1"/>
+          </a:fillRef>
+          <a:effectRef idx="2">
+            <a:schemeClr val="accent1"/>
+          </a:effectRef>
+          <a:fontRef idx="minor">
+            <a:schemeClr val="lt1"/>
+          </a:fontRef>
+        </p:style>
+        <p:txBody>
+          <a:bodyPr rtlCol="0" anchor="t"/>
+          <a:lstStyle/>
+          <a:p>
+            <a:pPr algn="ctr"/>
+            <a:r>
+              <a:rPr kumimoji="1" lang="ja-JP" altLang="en-US" b="1" dirty="0" smtClean="0">
+                <a:solidFill>
+                  <a:srgbClr val="FF0000"/>
+                </a:solidFill>
+              </a:rPr>
+              <a:t>許可された通信の設定が入る</a:t>
+            </a:r>
+            <a:endParaRPr kumimoji="1" lang="ja-JP" altLang="en-US" b="1" dirty="0">
+              <a:solidFill>
+                <a:srgbClr val="FF0000"/>
+              </a:solidFill>
+            </a:endParaRPr>
+          </a:p>
+        </p:txBody>
+      </p:sp>
+      <p:sp>
+        <p:nvSpPr>
+          <p:cNvPr id="55" name="フリーフォーム 54"/>
+          <p:cNvSpPr/>
+          <p:nvPr/>
+        </p:nvSpPr>
+        <p:spPr>
+          <a:xfrm>
+            <a:off x="1065675" y="2627866"/>
+            <a:ext cx="4715245" cy="2893972"/>
+          </a:xfrm>
+          <a:custGeom>
+            <a:avLst/>
+            <a:gdLst>
+              <a:gd name="connsiteX0" fmla="*/ 0 w 4715245"/>
+              <a:gd name="connsiteY0" fmla="*/ 2759259 h 2897012"/>
+              <a:gd name="connsiteX1" fmla="*/ 2116751 w 4715245"/>
+              <a:gd name="connsiteY1" fmla="*/ 2744660 h 2897012"/>
+              <a:gd name="connsiteX2" fmla="*/ 4627656 w 4715245"/>
+              <a:gd name="connsiteY2" fmla="*/ 1211738 h 2897012"/>
+              <a:gd name="connsiteX3" fmla="*/ 3985331 w 4715245"/>
+              <a:gd name="connsiteY3" fmla="*/ 890554 h 2897012"/>
+              <a:gd name="connsiteX4" fmla="*/ 4715245 w 4715245"/>
+              <a:gd name="connsiteY4" fmla="*/ 0 h 2897012"/>
+              <a:gd name="connsiteX0" fmla="*/ 0 w 4715245"/>
+              <a:gd name="connsiteY0" fmla="*/ 2759259 h 2897012"/>
+              <a:gd name="connsiteX1" fmla="*/ 2116751 w 4715245"/>
+              <a:gd name="connsiteY1" fmla="*/ 2744660 h 2897012"/>
+              <a:gd name="connsiteX2" fmla="*/ 4627656 w 4715245"/>
+              <a:gd name="connsiteY2" fmla="*/ 1211738 h 2897012"/>
+              <a:gd name="connsiteX3" fmla="*/ 4102118 w 4715245"/>
+              <a:gd name="connsiteY3" fmla="*/ 963550 h 2897012"/>
+              <a:gd name="connsiteX4" fmla="*/ 4715245 w 4715245"/>
+              <a:gd name="connsiteY4" fmla="*/ 0 h 2897012"/>
+              <a:gd name="connsiteX0" fmla="*/ 0 w 4715245"/>
+              <a:gd name="connsiteY0" fmla="*/ 2759259 h 2893972"/>
+              <a:gd name="connsiteX1" fmla="*/ 2116751 w 4715245"/>
+              <a:gd name="connsiteY1" fmla="*/ 2744660 h 2893972"/>
+              <a:gd name="connsiteX2" fmla="*/ 4394083 w 4715245"/>
+              <a:gd name="connsiteY2" fmla="*/ 1255536 h 2893972"/>
+              <a:gd name="connsiteX3" fmla="*/ 4102118 w 4715245"/>
+              <a:gd name="connsiteY3" fmla="*/ 963550 h 2893972"/>
+              <a:gd name="connsiteX4" fmla="*/ 4715245 w 4715245"/>
+              <a:gd name="connsiteY4" fmla="*/ 0 h 2893972"/>
+            </a:gdLst>
+            <a:ahLst/>
+            <a:cxnLst>
+              <a:cxn ang="0">
+                <a:pos x="connsiteX0" y="connsiteY0"/>
+              </a:cxn>
+              <a:cxn ang="0">
+                <a:pos x="connsiteX1" y="connsiteY1"/>
+              </a:cxn>
+              <a:cxn ang="0">
+                <a:pos x="connsiteX2" y="connsiteY2"/>
+              </a:cxn>
+              <a:cxn ang="0">
+                <a:pos x="connsiteX3" y="connsiteY3"/>
+              </a:cxn>
+              <a:cxn ang="0">
+                <a:pos x="connsiteX4" y="connsiteY4"/>
+              </a:cxn>
+            </a:cxnLst>
+            <a:rect l="l" t="t" r="r" b="b"/>
+            <a:pathLst>
+              <a:path w="4715245" h="2893972">
+                <a:moveTo>
+                  <a:pt x="0" y="2759259"/>
+                </a:moveTo>
+                <a:cubicBezTo>
+                  <a:pt x="672737" y="2880919"/>
+                  <a:pt x="1384404" y="2995281"/>
+                  <a:pt x="2116751" y="2744660"/>
+                </a:cubicBezTo>
+                <a:cubicBezTo>
+                  <a:pt x="2849098" y="2494039"/>
+                  <a:pt x="4063189" y="1552388"/>
+                  <a:pt x="4394083" y="1255536"/>
+                </a:cubicBezTo>
+                <a:cubicBezTo>
+                  <a:pt x="4724978" y="958684"/>
+                  <a:pt x="4048591" y="1172806"/>
+                  <a:pt x="4102118" y="963550"/>
+                </a:cubicBezTo>
+                <a:cubicBezTo>
+                  <a:pt x="4155645" y="754294"/>
+                  <a:pt x="4357587" y="344299"/>
+                  <a:pt x="4715245" y="0"/>
+                </a:cubicBezTo>
+              </a:path>
+            </a:pathLst>
+          </a:custGeom>
+          <a:ln w="76200" cmpd="sng">
+            <a:solidFill>
+              <a:srgbClr val="FF0000"/>
+            </a:solidFill>
+            <a:headEnd type="none"/>
+            <a:tailEnd type="arrow"/>
+          </a:ln>
+        </p:spPr>
+        <p:style>
+          <a:lnRef idx="2">
+            <a:schemeClr val="accent1"/>
+          </a:lnRef>
+          <a:fillRef idx="0">
+            <a:schemeClr val="accent1"/>
+          </a:fillRef>
+          <a:effectRef idx="1">
+            <a:schemeClr val="accent1"/>
+          </a:effectRef>
+          <a:fontRef idx="minor">
+            <a:schemeClr val="tx1"/>
+          </a:fontRef>
+        </p:style>
+        <p:txBody>
+          <a:bodyPr rtlCol="0" anchor="ctr"/>
+          <a:lstStyle/>
+          <a:p>
+            <a:pPr algn="ctr"/>
+            <a:endParaRPr kumimoji="1" lang="ja-JP" altLang="en-US"/>
+          </a:p>
+        </p:txBody>
+      </p:sp>
+      <p:sp>
+        <p:nvSpPr>
+          <p:cNvPr id="58" name="フリーフォーム 57"/>
+          <p:cNvSpPr/>
+          <p:nvPr/>
+        </p:nvSpPr>
+        <p:spPr>
+          <a:xfrm>
+            <a:off x="812322" y="2540269"/>
+            <a:ext cx="4355470" cy="2286004"/>
+          </a:xfrm>
+          <a:custGeom>
+            <a:avLst/>
+            <a:gdLst>
+              <a:gd name="connsiteX0" fmla="*/ 0 w 4715245"/>
+              <a:gd name="connsiteY0" fmla="*/ 2759259 h 2897012"/>
+              <a:gd name="connsiteX1" fmla="*/ 2116751 w 4715245"/>
+              <a:gd name="connsiteY1" fmla="*/ 2744660 h 2897012"/>
+              <a:gd name="connsiteX2" fmla="*/ 4627656 w 4715245"/>
+              <a:gd name="connsiteY2" fmla="*/ 1211738 h 2897012"/>
+              <a:gd name="connsiteX3" fmla="*/ 3985331 w 4715245"/>
+              <a:gd name="connsiteY3" fmla="*/ 890554 h 2897012"/>
+              <a:gd name="connsiteX4" fmla="*/ 4715245 w 4715245"/>
+              <a:gd name="connsiteY4" fmla="*/ 0 h 2897012"/>
+              <a:gd name="connsiteX0" fmla="*/ 0 w 4715245"/>
+              <a:gd name="connsiteY0" fmla="*/ 2759259 h 2897012"/>
+              <a:gd name="connsiteX1" fmla="*/ 2116751 w 4715245"/>
+              <a:gd name="connsiteY1" fmla="*/ 2744660 h 2897012"/>
+              <a:gd name="connsiteX2" fmla="*/ 4510869 w 4715245"/>
+              <a:gd name="connsiteY2" fmla="*/ 1211738 h 2897012"/>
+              <a:gd name="connsiteX3" fmla="*/ 3985331 w 4715245"/>
+              <a:gd name="connsiteY3" fmla="*/ 890554 h 2897012"/>
+              <a:gd name="connsiteX4" fmla="*/ 4715245 w 4715245"/>
+              <a:gd name="connsiteY4" fmla="*/ 0 h 2897012"/>
+              <a:gd name="connsiteX0" fmla="*/ 0 w 4715245"/>
+              <a:gd name="connsiteY0" fmla="*/ 2759259 h 2839330"/>
+              <a:gd name="connsiteX1" fmla="*/ 2116751 w 4715245"/>
+              <a:gd name="connsiteY1" fmla="*/ 2744660 h 2839330"/>
+              <a:gd name="connsiteX2" fmla="*/ 2832067 w 4715245"/>
+              <a:gd name="connsiteY2" fmla="*/ 2102293 h 2839330"/>
+              <a:gd name="connsiteX3" fmla="*/ 4510869 w 4715245"/>
+              <a:gd name="connsiteY3" fmla="*/ 1211738 h 2839330"/>
+              <a:gd name="connsiteX4" fmla="*/ 3985331 w 4715245"/>
+              <a:gd name="connsiteY4" fmla="*/ 890554 h 2839330"/>
+              <a:gd name="connsiteX5" fmla="*/ 4715245 w 4715245"/>
+              <a:gd name="connsiteY5" fmla="*/ 0 h 2839330"/>
+              <a:gd name="connsiteX0" fmla="*/ 0 w 4715245"/>
+              <a:gd name="connsiteY0" fmla="*/ 2759259 h 2765416"/>
+              <a:gd name="connsiteX1" fmla="*/ 2131349 w 4715245"/>
+              <a:gd name="connsiteY1" fmla="*/ 1051147 h 2765416"/>
+              <a:gd name="connsiteX2" fmla="*/ 2832067 w 4715245"/>
+              <a:gd name="connsiteY2" fmla="*/ 2102293 h 2765416"/>
+              <a:gd name="connsiteX3" fmla="*/ 4510869 w 4715245"/>
+              <a:gd name="connsiteY3" fmla="*/ 1211738 h 2765416"/>
+              <a:gd name="connsiteX4" fmla="*/ 3985331 w 4715245"/>
+              <a:gd name="connsiteY4" fmla="*/ 890554 h 2765416"/>
+              <a:gd name="connsiteX5" fmla="*/ 4715245 w 4715245"/>
+              <a:gd name="connsiteY5" fmla="*/ 0 h 2765416"/>
+              <a:gd name="connsiteX0" fmla="*/ 0 w 4715245"/>
+              <a:gd name="connsiteY0" fmla="*/ 2759259 h 2765416"/>
+              <a:gd name="connsiteX1" fmla="*/ 2131349 w 4715245"/>
+              <a:gd name="connsiteY1" fmla="*/ 1051147 h 2765416"/>
+              <a:gd name="connsiteX2" fmla="*/ 2832067 w 4715245"/>
+              <a:gd name="connsiteY2" fmla="*/ 2102293 h 2765416"/>
+              <a:gd name="connsiteX3" fmla="*/ 4510869 w 4715245"/>
+              <a:gd name="connsiteY3" fmla="*/ 1211738 h 2765416"/>
+              <a:gd name="connsiteX4" fmla="*/ 3985331 w 4715245"/>
+              <a:gd name="connsiteY4" fmla="*/ 890554 h 2765416"/>
+              <a:gd name="connsiteX5" fmla="*/ 4715245 w 4715245"/>
+              <a:gd name="connsiteY5" fmla="*/ 0 h 2765416"/>
+              <a:gd name="connsiteX0" fmla="*/ 0 w 4175109"/>
+              <a:gd name="connsiteY0" fmla="*/ 0 h 2291994"/>
+              <a:gd name="connsiteX1" fmla="*/ 1591213 w 4175109"/>
+              <a:gd name="connsiteY1" fmla="*/ 1197140 h 2291994"/>
+              <a:gd name="connsiteX2" fmla="*/ 2291931 w 4175109"/>
+              <a:gd name="connsiteY2" fmla="*/ 2248286 h 2291994"/>
+              <a:gd name="connsiteX3" fmla="*/ 3970733 w 4175109"/>
+              <a:gd name="connsiteY3" fmla="*/ 1357731 h 2291994"/>
+              <a:gd name="connsiteX4" fmla="*/ 3445195 w 4175109"/>
+              <a:gd name="connsiteY4" fmla="*/ 1036547 h 2291994"/>
+              <a:gd name="connsiteX5" fmla="*/ 4175109 w 4175109"/>
+              <a:gd name="connsiteY5" fmla="*/ 145993 h 2291994"/>
+              <a:gd name="connsiteX0" fmla="*/ 180361 w 4355470"/>
+              <a:gd name="connsiteY0" fmla="*/ 0 h 2286004"/>
+              <a:gd name="connsiteX1" fmla="*/ 78173 w 4355470"/>
+              <a:gd name="connsiteY1" fmla="*/ 1124144 h 2286004"/>
+              <a:gd name="connsiteX2" fmla="*/ 1771574 w 4355470"/>
+              <a:gd name="connsiteY2" fmla="*/ 1197140 h 2286004"/>
+              <a:gd name="connsiteX3" fmla="*/ 2472292 w 4355470"/>
+              <a:gd name="connsiteY3" fmla="*/ 2248286 h 2286004"/>
+              <a:gd name="connsiteX4" fmla="*/ 4151094 w 4355470"/>
+              <a:gd name="connsiteY4" fmla="*/ 1357731 h 2286004"/>
+              <a:gd name="connsiteX5" fmla="*/ 3625556 w 4355470"/>
+              <a:gd name="connsiteY5" fmla="*/ 1036547 h 2286004"/>
+              <a:gd name="connsiteX6" fmla="*/ 4355470 w 4355470"/>
+              <a:gd name="connsiteY6" fmla="*/ 145993 h 2286004"/>
+              <a:gd name="connsiteX0" fmla="*/ 180361 w 4355470"/>
+              <a:gd name="connsiteY0" fmla="*/ 0 h 2286004"/>
+              <a:gd name="connsiteX1" fmla="*/ 78173 w 4355470"/>
+              <a:gd name="connsiteY1" fmla="*/ 1124144 h 2286004"/>
+              <a:gd name="connsiteX2" fmla="*/ 1771574 w 4355470"/>
+              <a:gd name="connsiteY2" fmla="*/ 1197140 h 2286004"/>
+              <a:gd name="connsiteX3" fmla="*/ 2472292 w 4355470"/>
+              <a:gd name="connsiteY3" fmla="*/ 2248286 h 2286004"/>
+              <a:gd name="connsiteX4" fmla="*/ 3975914 w 4355470"/>
+              <a:gd name="connsiteY4" fmla="*/ 1357731 h 2286004"/>
+              <a:gd name="connsiteX5" fmla="*/ 3625556 w 4355470"/>
+              <a:gd name="connsiteY5" fmla="*/ 1036547 h 2286004"/>
+              <a:gd name="connsiteX6" fmla="*/ 4355470 w 4355470"/>
+              <a:gd name="connsiteY6" fmla="*/ 145993 h 2286004"/>
+            </a:gdLst>
+            <a:ahLst/>
+            <a:cxnLst>
+              <a:cxn ang="0">
+                <a:pos x="connsiteX0" y="connsiteY0"/>
+              </a:cxn>
+              <a:cxn ang="0">
+                <a:pos x="connsiteX1" y="connsiteY1"/>
+              </a:cxn>
+              <a:cxn ang="0">
+                <a:pos x="connsiteX2" y="connsiteY2"/>
+              </a:cxn>
+              <a:cxn ang="0">
+                <a:pos x="connsiteX3" y="connsiteY3"/>
+              </a:cxn>
+              <a:cxn ang="0">
+                <a:pos x="connsiteX4" y="connsiteY4"/>
+              </a:cxn>
+              <a:cxn ang="0">
+                <a:pos x="connsiteX5" y="connsiteY5"/>
+              </a:cxn>
+              <a:cxn ang="0">
+                <a:pos x="connsiteX6" y="connsiteY6"/>
+              </a:cxn>
+            </a:cxnLst>
+            <a:rect l="l" t="t" r="r" b="b"/>
+            <a:pathLst>
+              <a:path w="4355470" h="2286004">
+                <a:moveTo>
+                  <a:pt x="180361" y="0"/>
+                </a:moveTo>
+                <a:cubicBezTo>
+                  <a:pt x="319045" y="75430"/>
+                  <a:pt x="-187029" y="924621"/>
+                  <a:pt x="78173" y="1124144"/>
+                </a:cubicBezTo>
+                <a:cubicBezTo>
+                  <a:pt x="343375" y="1323667"/>
+                  <a:pt x="1372554" y="1009783"/>
+                  <a:pt x="1771574" y="1197140"/>
+                </a:cubicBezTo>
+                <a:cubicBezTo>
+                  <a:pt x="2170594" y="1384497"/>
+                  <a:pt x="2073272" y="2503773"/>
+                  <a:pt x="2472292" y="2248286"/>
+                </a:cubicBezTo>
+                <a:cubicBezTo>
+                  <a:pt x="3002697" y="2226387"/>
+                  <a:pt x="3783703" y="1559687"/>
+                  <a:pt x="3975914" y="1357731"/>
+                </a:cubicBezTo>
+                <a:cubicBezTo>
+                  <a:pt x="4168125" y="1155775"/>
+                  <a:pt x="3562297" y="1238503"/>
+                  <a:pt x="3625556" y="1036547"/>
+                </a:cubicBezTo>
+                <a:cubicBezTo>
+                  <a:pt x="3688815" y="834591"/>
+                  <a:pt x="3997812" y="490292"/>
+                  <a:pt x="4355470" y="145993"/>
+                </a:cubicBezTo>
+              </a:path>
+            </a:pathLst>
+          </a:custGeom>
+          <a:ln w="76200" cmpd="sng">
+            <a:solidFill>
+              <a:srgbClr val="FF0000"/>
+            </a:solidFill>
+            <a:headEnd type="none"/>
+            <a:tailEnd type="arrow"/>
+          </a:ln>
+        </p:spPr>
+        <p:style>
+          <a:lnRef idx="2">
+            <a:schemeClr val="accent1"/>
+          </a:lnRef>
+          <a:fillRef idx="0">
+            <a:schemeClr val="accent1"/>
+          </a:fillRef>
+          <a:effectRef idx="1">
+            <a:schemeClr val="accent1"/>
+          </a:effectRef>
+          <a:fontRef idx="minor">
+            <a:schemeClr val="tx1"/>
+          </a:fontRef>
+        </p:style>
+        <p:txBody>
+          <a:bodyPr rtlCol="0" anchor="ctr"/>
+          <a:lstStyle/>
+          <a:p>
+            <a:pPr algn="ctr"/>
+            <a:endParaRPr kumimoji="1" lang="ja-JP" altLang="en-US"/>
+          </a:p>
+        </p:txBody>
+      </p:sp>
+      <p:sp>
+        <p:nvSpPr>
+          <p:cNvPr id="57" name="ドーナツ 56"/>
+          <p:cNvSpPr/>
+          <p:nvPr/>
+        </p:nvSpPr>
+        <p:spPr>
+          <a:xfrm>
+            <a:off x="4594928" y="2423476"/>
+            <a:ext cx="794729" cy="817558"/>
+          </a:xfrm>
+          <a:prstGeom prst="donut">
+            <a:avLst>
+              <a:gd name="adj" fmla="val 15190"/>
+            </a:avLst>
+          </a:prstGeom>
+          <a:solidFill>
+            <a:srgbClr val="FF0000"/>
+          </a:solidFill>
+          <a:ln>
+            <a:solidFill>
+              <a:schemeClr val="bg1"/>
+            </a:solidFill>
+          </a:ln>
+        </p:spPr>
+        <p:style>
+          <a:lnRef idx="1">
+            <a:schemeClr val="accent1"/>
+          </a:lnRef>
+          <a:fillRef idx="3">
+            <a:schemeClr val="accent1"/>
+          </a:fillRef>
+          <a:effectRef idx="2">
+            <a:schemeClr val="accent1"/>
+          </a:effectRef>
+          <a:fontRef idx="minor">
+            <a:schemeClr val="lt1"/>
+          </a:fontRef>
+        </p:style>
+        <p:txBody>
+          <a:bodyPr rtlCol="0" anchor="ctr"/>
+          <a:lstStyle/>
+          <a:p>
+            <a:pPr algn="ctr"/>
+            <a:endParaRPr kumimoji="1" lang="ja-JP" altLang="en-US">
+              <a:solidFill>
+                <a:schemeClr val="tx1"/>
+              </a:solidFill>
+            </a:endParaRPr>
+          </a:p>
+        </p:txBody>
+      </p:sp>
+      <p:sp>
+        <p:nvSpPr>
+          <p:cNvPr id="59" name="乗算記号 58"/>
+          <p:cNvSpPr/>
+          <p:nvPr/>
+        </p:nvSpPr>
+        <p:spPr>
+          <a:xfrm>
+            <a:off x="5167792" y="2233686"/>
+            <a:ext cx="1325554" cy="1211738"/>
+          </a:xfrm>
+          <a:prstGeom prst="mathMultiply">
+            <a:avLst>
+              <a:gd name="adj1" fmla="val 10267"/>
+            </a:avLst>
+          </a:prstGeom>
+          <a:solidFill>
+            <a:srgbClr val="FF0000"/>
+          </a:solidFill>
+          <a:ln>
+            <a:solidFill>
+              <a:srgbClr val="FFFFFF"/>
+            </a:solidFill>
+          </a:ln>
+        </p:spPr>
+        <p:style>
+          <a:lnRef idx="1">
+            <a:schemeClr val="accent1"/>
+          </a:lnRef>
+          <a:fillRef idx="3">
+            <a:schemeClr val="accent1"/>
+          </a:fillRef>
+          <a:effectRef idx="2">
+            <a:schemeClr val="accent1"/>
+          </a:effectRef>
+          <a:fontRef idx="minor">
+            <a:schemeClr val="lt1"/>
+          </a:fontRef>
+        </p:style>
+        <p:txBody>
+          <a:bodyPr rtlCol="0" anchor="ctr"/>
+          <a:lstStyle/>
+          <a:p>
+            <a:pPr algn="ctr"/>
+            <a:endParaRPr kumimoji="1" lang="ja-JP" altLang="en-US"/>
+          </a:p>
+        </p:txBody>
+      </p:sp>
+    </p:spTree>
+    <p:extLst>
+      <p:ext uri="{BB962C8B-B14F-4D97-AF65-F5344CB8AC3E}">
+        <p14:creationId xmlns:p14="http://schemas.microsoft.com/office/powerpoint/2010/main" val="1969180566"/>
+      </p:ext>
+    </p:extLst>
+  </p:cSld>
+  <p:clrMapOvr>
+    <a:masterClrMapping/>
+  </p:clrMapOvr>
+</p:sld>
+</file>
+
+<file path=ppt/slides/slide3.xml><?xml version="1.0" encoding="utf-8"?>
 <p:sld xmlns:a="http://schemas.openxmlformats.org/drawingml/2006/main" xmlns:r="http://schemas.openxmlformats.org/officeDocument/2006/relationships" xmlns:p="http://schemas.openxmlformats.org/presentationml/2006/main">
   <p:cSld>
     <p:spTree>

</xml_diff>

<commit_message>
Add a new figure to show how dhcp communicate with VMs
</commit_message>
<xml_diff>
--- a/images/openvnet/src/figures_yamazaki.pptx
+++ b/images/openvnet/src/figures_yamazaki.pptx
@@ -7,7 +7,8 @@
   <p:sldIdLst>
     <p:sldId id="256" r:id="rId2"/>
     <p:sldId id="258" r:id="rId3"/>
-    <p:sldId id="257" r:id="rId4"/>
+    <p:sldId id="259" r:id="rId4"/>
+    <p:sldId id="257" r:id="rId5"/>
   </p:sldIdLst>
   <p:sldSz cx="9144000" cy="6858000" type="screen4x3"/>
   <p:notesSz cx="6858000" cy="9144000"/>
@@ -7168,6 +7169,1523 @@
 </file>
 
 <file path=ppt/slides/slide3.xml><?xml version="1.0" encoding="utf-8"?>
+<p:sld xmlns:a="http://schemas.openxmlformats.org/drawingml/2006/main" xmlns:r="http://schemas.openxmlformats.org/officeDocument/2006/relationships" xmlns:p="http://schemas.openxmlformats.org/presentationml/2006/main">
+  <p:cSld>
+    <p:spTree>
+      <p:nvGrpSpPr>
+        <p:cNvPr id="1" name=""/>
+        <p:cNvGrpSpPr/>
+        <p:nvPr/>
+      </p:nvGrpSpPr>
+      <p:grpSpPr>
+        <a:xfrm>
+          <a:off x="0" y="0"/>
+          <a:ext cx="0" cy="0"/>
+          <a:chOff x="0" y="0"/>
+          <a:chExt cx="0" cy="0"/>
+        </a:xfrm>
+      </p:grpSpPr>
+      <p:sp>
+        <p:nvSpPr>
+          <p:cNvPr id="2" name="正方形/長方形 1"/>
+          <p:cNvSpPr/>
+          <p:nvPr/>
+        </p:nvSpPr>
+        <p:spPr>
+          <a:xfrm>
+            <a:off x="437948" y="394180"/>
+            <a:ext cx="4131315" cy="3737409"/>
+          </a:xfrm>
+          <a:prstGeom prst="rect">
+            <a:avLst/>
+          </a:prstGeom>
+        </p:spPr>
+        <p:style>
+          <a:lnRef idx="2">
+            <a:schemeClr val="accent2"/>
+          </a:lnRef>
+          <a:fillRef idx="1">
+            <a:schemeClr val="lt1"/>
+          </a:fillRef>
+          <a:effectRef idx="0">
+            <a:schemeClr val="accent2"/>
+          </a:effectRef>
+          <a:fontRef idx="minor">
+            <a:schemeClr val="dk1"/>
+          </a:fontRef>
+        </p:style>
+        <p:txBody>
+          <a:bodyPr rtlCol="0" anchor="t"/>
+          <a:lstStyle/>
+          <a:p>
+            <a:pPr algn="ctr"/>
+            <a:r>
+              <a:rPr kumimoji="1" lang="ja-JP" altLang="en-US" dirty="0" smtClean="0"/>
+              <a:t>物理マシン</a:t>
+            </a:r>
+            <a:r>
+              <a:rPr kumimoji="1" lang="en-US" altLang="ja-JP" dirty="0" smtClean="0"/>
+              <a:t>X</a:t>
+            </a:r>
+            <a:endParaRPr kumimoji="1" lang="ja-JP" altLang="en-US" dirty="0"/>
+          </a:p>
+        </p:txBody>
+      </p:sp>
+      <p:grpSp>
+        <p:nvGrpSpPr>
+          <p:cNvPr id="3" name="図形グループ 2"/>
+          <p:cNvGrpSpPr/>
+          <p:nvPr/>
+        </p:nvGrpSpPr>
+        <p:grpSpPr>
+          <a:xfrm>
+            <a:off x="729916" y="3255633"/>
+            <a:ext cx="2218939" cy="540173"/>
+            <a:chOff x="802906" y="3255633"/>
+            <a:chExt cx="2218939" cy="540173"/>
+          </a:xfrm>
+        </p:grpSpPr>
+        <p:sp>
+          <p:nvSpPr>
+            <p:cNvPr id="4" name="角丸四角形 3"/>
+            <p:cNvSpPr/>
+            <p:nvPr/>
+          </p:nvSpPr>
+          <p:spPr>
+            <a:xfrm>
+              <a:off x="802906" y="3255633"/>
+              <a:ext cx="2218939" cy="540173"/>
+            </a:xfrm>
+            <a:prstGeom prst="roundRect">
+              <a:avLst/>
+            </a:prstGeom>
+          </p:spPr>
+          <p:style>
+            <a:lnRef idx="1">
+              <a:schemeClr val="accent1"/>
+            </a:lnRef>
+            <a:fillRef idx="3">
+              <a:schemeClr val="accent1"/>
+            </a:fillRef>
+            <a:effectRef idx="2">
+              <a:schemeClr val="accent1"/>
+            </a:effectRef>
+            <a:fontRef idx="minor">
+              <a:schemeClr val="lt1"/>
+            </a:fontRef>
+          </p:style>
+          <p:txBody>
+            <a:bodyPr rtlCol="0" anchor="ctr"/>
+            <a:lstStyle/>
+            <a:p>
+              <a:pPr algn="ctr"/>
+              <a:endParaRPr kumimoji="1" lang="ja-JP" altLang="en-US"/>
+            </a:p>
+          </p:txBody>
+        </p:sp>
+        <p:sp>
+          <p:nvSpPr>
+            <p:cNvPr id="5" name="正方形/長方形 4"/>
+            <p:cNvSpPr/>
+            <p:nvPr/>
+          </p:nvSpPr>
+          <p:spPr>
+            <a:xfrm>
+              <a:off x="1007281" y="3401626"/>
+              <a:ext cx="233572" cy="233588"/>
+            </a:xfrm>
+            <a:prstGeom prst="rect">
+              <a:avLst/>
+            </a:prstGeom>
+          </p:spPr>
+          <p:style>
+            <a:lnRef idx="2">
+              <a:schemeClr val="dk1">
+                <a:shade val="50000"/>
+              </a:schemeClr>
+            </a:lnRef>
+            <a:fillRef idx="1">
+              <a:schemeClr val="dk1"/>
+            </a:fillRef>
+            <a:effectRef idx="0">
+              <a:schemeClr val="dk1"/>
+            </a:effectRef>
+            <a:fontRef idx="minor">
+              <a:schemeClr val="lt1"/>
+            </a:fontRef>
+          </p:style>
+          <p:txBody>
+            <a:bodyPr rtlCol="0" anchor="ctr"/>
+            <a:lstStyle/>
+            <a:p>
+              <a:pPr algn="ctr"/>
+              <a:endParaRPr kumimoji="1" lang="ja-JP" altLang="en-US"/>
+            </a:p>
+          </p:txBody>
+        </p:sp>
+        <p:sp>
+          <p:nvSpPr>
+            <p:cNvPr id="6" name="正方形/長方形 5"/>
+            <p:cNvSpPr/>
+            <p:nvPr/>
+          </p:nvSpPr>
+          <p:spPr>
+            <a:xfrm>
+              <a:off x="1393253" y="3401626"/>
+              <a:ext cx="233572" cy="233588"/>
+            </a:xfrm>
+            <a:prstGeom prst="rect">
+              <a:avLst/>
+            </a:prstGeom>
+          </p:spPr>
+          <p:style>
+            <a:lnRef idx="2">
+              <a:schemeClr val="dk1">
+                <a:shade val="50000"/>
+              </a:schemeClr>
+            </a:lnRef>
+            <a:fillRef idx="1">
+              <a:schemeClr val="dk1"/>
+            </a:fillRef>
+            <a:effectRef idx="0">
+              <a:schemeClr val="dk1"/>
+            </a:effectRef>
+            <a:fontRef idx="minor">
+              <a:schemeClr val="lt1"/>
+            </a:fontRef>
+          </p:style>
+          <p:txBody>
+            <a:bodyPr rtlCol="0" anchor="ctr"/>
+            <a:lstStyle/>
+            <a:p>
+              <a:pPr algn="ctr"/>
+              <a:endParaRPr kumimoji="1" lang="ja-JP" altLang="en-US"/>
+            </a:p>
+          </p:txBody>
+        </p:sp>
+        <p:sp>
+          <p:nvSpPr>
+            <p:cNvPr id="7" name="正方形/長方形 6"/>
+            <p:cNvSpPr/>
+            <p:nvPr/>
+          </p:nvSpPr>
+          <p:spPr>
+            <a:xfrm>
+              <a:off x="1785641" y="3401626"/>
+              <a:ext cx="233572" cy="233588"/>
+            </a:xfrm>
+            <a:prstGeom prst="rect">
+              <a:avLst/>
+            </a:prstGeom>
+          </p:spPr>
+          <p:style>
+            <a:lnRef idx="2">
+              <a:schemeClr val="dk1">
+                <a:shade val="50000"/>
+              </a:schemeClr>
+            </a:lnRef>
+            <a:fillRef idx="1">
+              <a:schemeClr val="dk1"/>
+            </a:fillRef>
+            <a:effectRef idx="0">
+              <a:schemeClr val="dk1"/>
+            </a:effectRef>
+            <a:fontRef idx="minor">
+              <a:schemeClr val="lt1"/>
+            </a:fontRef>
+          </p:style>
+          <p:txBody>
+            <a:bodyPr rtlCol="0" anchor="ctr"/>
+            <a:lstStyle/>
+            <a:p>
+              <a:pPr algn="ctr"/>
+              <a:endParaRPr kumimoji="1" lang="ja-JP" altLang="en-US"/>
+            </a:p>
+          </p:txBody>
+        </p:sp>
+        <p:sp>
+          <p:nvSpPr>
+            <p:cNvPr id="8" name="正方形/長方形 7"/>
+            <p:cNvSpPr/>
+            <p:nvPr/>
+          </p:nvSpPr>
+          <p:spPr>
+            <a:xfrm>
+              <a:off x="2171613" y="3401626"/>
+              <a:ext cx="233572" cy="233588"/>
+            </a:xfrm>
+            <a:prstGeom prst="rect">
+              <a:avLst/>
+            </a:prstGeom>
+          </p:spPr>
+          <p:style>
+            <a:lnRef idx="2">
+              <a:schemeClr val="dk1">
+                <a:shade val="50000"/>
+              </a:schemeClr>
+            </a:lnRef>
+            <a:fillRef idx="1">
+              <a:schemeClr val="dk1"/>
+            </a:fillRef>
+            <a:effectRef idx="0">
+              <a:schemeClr val="dk1"/>
+            </a:effectRef>
+            <a:fontRef idx="minor">
+              <a:schemeClr val="lt1"/>
+            </a:fontRef>
+          </p:style>
+          <p:txBody>
+            <a:bodyPr rtlCol="0" anchor="ctr"/>
+            <a:lstStyle/>
+            <a:p>
+              <a:pPr algn="ctr"/>
+              <a:endParaRPr kumimoji="1" lang="ja-JP" altLang="en-US"/>
+            </a:p>
+          </p:txBody>
+        </p:sp>
+        <p:sp>
+          <p:nvSpPr>
+            <p:cNvPr id="9" name="正方形/長方形 8"/>
+            <p:cNvSpPr/>
+            <p:nvPr/>
+          </p:nvSpPr>
+          <p:spPr>
+            <a:xfrm>
+              <a:off x="2557585" y="3401626"/>
+              <a:ext cx="233572" cy="233588"/>
+            </a:xfrm>
+            <a:prstGeom prst="rect">
+              <a:avLst/>
+            </a:prstGeom>
+          </p:spPr>
+          <p:style>
+            <a:lnRef idx="2">
+              <a:schemeClr val="dk1">
+                <a:shade val="50000"/>
+              </a:schemeClr>
+            </a:lnRef>
+            <a:fillRef idx="1">
+              <a:schemeClr val="dk1"/>
+            </a:fillRef>
+            <a:effectRef idx="0">
+              <a:schemeClr val="dk1"/>
+            </a:effectRef>
+            <a:fontRef idx="minor">
+              <a:schemeClr val="lt1"/>
+            </a:fontRef>
+          </p:style>
+          <p:txBody>
+            <a:bodyPr rtlCol="0" anchor="ctr"/>
+            <a:lstStyle/>
+            <a:p>
+              <a:pPr algn="ctr"/>
+              <a:endParaRPr kumimoji="1" lang="ja-JP" altLang="en-US"/>
+            </a:p>
+          </p:txBody>
+        </p:sp>
+      </p:grpSp>
+      <p:grpSp>
+        <p:nvGrpSpPr>
+          <p:cNvPr id="10" name="図形グループ 9"/>
+          <p:cNvGrpSpPr/>
+          <p:nvPr/>
+        </p:nvGrpSpPr>
+        <p:grpSpPr>
+          <a:xfrm>
+            <a:off x="760233" y="1357731"/>
+            <a:ext cx="890496" cy="1328532"/>
+            <a:chOff x="7123962" y="1357731"/>
+            <a:chExt cx="890496" cy="1328532"/>
+          </a:xfrm>
+        </p:grpSpPr>
+        <p:sp>
+          <p:nvSpPr>
+            <p:cNvPr id="11" name="正方形/長方形 10"/>
+            <p:cNvSpPr/>
+            <p:nvPr/>
+          </p:nvSpPr>
+          <p:spPr>
+            <a:xfrm>
+              <a:off x="7123962" y="1357731"/>
+              <a:ext cx="890496" cy="1328532"/>
+            </a:xfrm>
+            <a:prstGeom prst="rect">
+              <a:avLst/>
+            </a:prstGeom>
+          </p:spPr>
+          <p:style>
+            <a:lnRef idx="1">
+              <a:schemeClr val="accent1"/>
+            </a:lnRef>
+            <a:fillRef idx="3">
+              <a:schemeClr val="accent1"/>
+            </a:fillRef>
+            <a:effectRef idx="2">
+              <a:schemeClr val="accent1"/>
+            </a:effectRef>
+            <a:fontRef idx="minor">
+              <a:schemeClr val="lt1"/>
+            </a:fontRef>
+          </p:style>
+          <p:txBody>
+            <a:bodyPr rtlCol="0" anchor="t"/>
+            <a:lstStyle/>
+            <a:p>
+              <a:pPr algn="ctr"/>
+              <a:r>
+                <a:rPr kumimoji="1" lang="ja-JP" altLang="en-US" dirty="0" smtClean="0"/>
+                <a:t>仮想</a:t>
+              </a:r>
+              <a:r>
+                <a:rPr kumimoji="1" lang="en-US" altLang="ja-JP" dirty="0" smtClean="0"/>
+                <a:t/>
+              </a:r>
+              <a:br>
+                <a:rPr kumimoji="1" lang="en-US" altLang="ja-JP" dirty="0" smtClean="0"/>
+              </a:br>
+              <a:r>
+                <a:rPr kumimoji="1" lang="ja-JP" altLang="en-US" dirty="0" smtClean="0"/>
+                <a:t>マシン</a:t>
+              </a:r>
+              <a:endParaRPr kumimoji="1" lang="en-US" altLang="ja-JP" dirty="0" smtClean="0"/>
+            </a:p>
+            <a:p>
+              <a:pPr algn="ctr"/>
+              <a:r>
+                <a:rPr kumimoji="1" lang="en-US" altLang="ja-JP" dirty="0" smtClean="0"/>
+                <a:t>1</a:t>
+              </a:r>
+              <a:endParaRPr kumimoji="1" lang="ja-JP" altLang="en-US" dirty="0"/>
+            </a:p>
+          </p:txBody>
+        </p:sp>
+        <p:sp>
+          <p:nvSpPr>
+            <p:cNvPr id="12" name="正方形/長方形 11"/>
+            <p:cNvSpPr/>
+            <p:nvPr/>
+          </p:nvSpPr>
+          <p:spPr>
+            <a:xfrm>
+              <a:off x="7446245" y="2423476"/>
+              <a:ext cx="233572" cy="233588"/>
+            </a:xfrm>
+            <a:prstGeom prst="rect">
+              <a:avLst/>
+            </a:prstGeom>
+          </p:spPr>
+          <p:style>
+            <a:lnRef idx="2">
+              <a:schemeClr val="dk1">
+                <a:shade val="50000"/>
+              </a:schemeClr>
+            </a:lnRef>
+            <a:fillRef idx="1">
+              <a:schemeClr val="dk1"/>
+            </a:fillRef>
+            <a:effectRef idx="0">
+              <a:schemeClr val="dk1"/>
+            </a:effectRef>
+            <a:fontRef idx="minor">
+              <a:schemeClr val="lt1"/>
+            </a:fontRef>
+          </p:style>
+          <p:txBody>
+            <a:bodyPr rtlCol="0" anchor="ctr"/>
+            <a:lstStyle/>
+            <a:p>
+              <a:pPr algn="ctr"/>
+              <a:endParaRPr kumimoji="1" lang="ja-JP" altLang="en-US"/>
+            </a:p>
+          </p:txBody>
+        </p:sp>
+      </p:grpSp>
+      <p:grpSp>
+        <p:nvGrpSpPr>
+          <p:cNvPr id="13" name="図形グループ 12"/>
+          <p:cNvGrpSpPr/>
+          <p:nvPr/>
+        </p:nvGrpSpPr>
+        <p:grpSpPr>
+          <a:xfrm>
+            <a:off x="2020981" y="1357731"/>
+            <a:ext cx="890496" cy="1328532"/>
+            <a:chOff x="7123962" y="1357731"/>
+            <a:chExt cx="890496" cy="1328532"/>
+          </a:xfrm>
+        </p:grpSpPr>
+        <p:sp>
+          <p:nvSpPr>
+            <p:cNvPr id="14" name="正方形/長方形 13"/>
+            <p:cNvSpPr/>
+            <p:nvPr/>
+          </p:nvSpPr>
+          <p:spPr>
+            <a:xfrm>
+              <a:off x="7123962" y="1357731"/>
+              <a:ext cx="890496" cy="1328532"/>
+            </a:xfrm>
+            <a:prstGeom prst="rect">
+              <a:avLst/>
+            </a:prstGeom>
+          </p:spPr>
+          <p:style>
+            <a:lnRef idx="1">
+              <a:schemeClr val="accent1"/>
+            </a:lnRef>
+            <a:fillRef idx="3">
+              <a:schemeClr val="accent1"/>
+            </a:fillRef>
+            <a:effectRef idx="2">
+              <a:schemeClr val="accent1"/>
+            </a:effectRef>
+            <a:fontRef idx="minor">
+              <a:schemeClr val="lt1"/>
+            </a:fontRef>
+          </p:style>
+          <p:txBody>
+            <a:bodyPr rtlCol="0" anchor="t"/>
+            <a:lstStyle/>
+            <a:p>
+              <a:pPr algn="ctr"/>
+              <a:r>
+                <a:rPr kumimoji="1" lang="ja-JP" altLang="en-US" dirty="0" smtClean="0"/>
+                <a:t>仮想</a:t>
+              </a:r>
+              <a:r>
+                <a:rPr kumimoji="1" lang="en-US" altLang="ja-JP" dirty="0" smtClean="0"/>
+                <a:t/>
+              </a:r>
+              <a:br>
+                <a:rPr kumimoji="1" lang="en-US" altLang="ja-JP" dirty="0" smtClean="0"/>
+              </a:br>
+              <a:r>
+                <a:rPr kumimoji="1" lang="ja-JP" altLang="en-US" dirty="0" smtClean="0"/>
+                <a:t>マシン</a:t>
+              </a:r>
+              <a:endParaRPr kumimoji="1" lang="en-US" altLang="ja-JP" dirty="0" smtClean="0"/>
+            </a:p>
+            <a:p>
+              <a:pPr algn="ctr"/>
+              <a:r>
+                <a:rPr lang="en-US" altLang="ja-JP" dirty="0"/>
+                <a:t>2</a:t>
+              </a:r>
+              <a:endParaRPr kumimoji="1" lang="ja-JP" altLang="en-US" dirty="0"/>
+            </a:p>
+          </p:txBody>
+        </p:sp>
+        <p:sp>
+          <p:nvSpPr>
+            <p:cNvPr id="15" name="正方形/長方形 14"/>
+            <p:cNvSpPr/>
+            <p:nvPr/>
+          </p:nvSpPr>
+          <p:spPr>
+            <a:xfrm>
+              <a:off x="7446245" y="2423476"/>
+              <a:ext cx="233572" cy="233588"/>
+            </a:xfrm>
+            <a:prstGeom prst="rect">
+              <a:avLst/>
+            </a:prstGeom>
+          </p:spPr>
+          <p:style>
+            <a:lnRef idx="2">
+              <a:schemeClr val="dk1">
+                <a:shade val="50000"/>
+              </a:schemeClr>
+            </a:lnRef>
+            <a:fillRef idx="1">
+              <a:schemeClr val="dk1"/>
+            </a:fillRef>
+            <a:effectRef idx="0">
+              <a:schemeClr val="dk1"/>
+            </a:effectRef>
+            <a:fontRef idx="minor">
+              <a:schemeClr val="lt1"/>
+            </a:fontRef>
+          </p:style>
+          <p:txBody>
+            <a:bodyPr rtlCol="0" anchor="ctr"/>
+            <a:lstStyle/>
+            <a:p>
+              <a:pPr algn="ctr"/>
+              <a:endParaRPr kumimoji="1" lang="ja-JP" altLang="en-US"/>
+            </a:p>
+          </p:txBody>
+        </p:sp>
+      </p:grpSp>
+      <p:cxnSp>
+        <p:nvCxnSpPr>
+          <p:cNvPr id="16" name="直線コネクタ 15"/>
+          <p:cNvCxnSpPr>
+            <a:stCxn id="12" idx="2"/>
+            <a:endCxn id="5" idx="0"/>
+          </p:cNvCxnSpPr>
+          <p:nvPr/>
+        </p:nvCxnSpPr>
+        <p:spPr>
+          <a:xfrm flipH="1">
+            <a:off x="1051077" y="2657064"/>
+            <a:ext cx="148225" cy="744562"/>
+          </a:xfrm>
+          <a:prstGeom prst="line">
+            <a:avLst/>
+          </a:prstGeom>
+        </p:spPr>
+        <p:style>
+          <a:lnRef idx="3">
+            <a:schemeClr val="dk1"/>
+          </a:lnRef>
+          <a:fillRef idx="0">
+            <a:schemeClr val="dk1"/>
+          </a:fillRef>
+          <a:effectRef idx="2">
+            <a:schemeClr val="dk1"/>
+          </a:effectRef>
+          <a:fontRef idx="minor">
+            <a:schemeClr val="tx1"/>
+          </a:fontRef>
+        </p:style>
+      </p:cxnSp>
+      <p:cxnSp>
+        <p:nvCxnSpPr>
+          <p:cNvPr id="17" name="直線コネクタ 16"/>
+          <p:cNvCxnSpPr>
+            <a:stCxn id="15" idx="2"/>
+            <a:endCxn id="7" idx="0"/>
+          </p:cNvCxnSpPr>
+          <p:nvPr/>
+        </p:nvCxnSpPr>
+        <p:spPr>
+          <a:xfrm flipH="1">
+            <a:off x="1829437" y="2657064"/>
+            <a:ext cx="630613" cy="744562"/>
+          </a:xfrm>
+          <a:prstGeom prst="line">
+            <a:avLst/>
+          </a:prstGeom>
+        </p:spPr>
+        <p:style>
+          <a:lnRef idx="3">
+            <a:schemeClr val="dk1"/>
+          </a:lnRef>
+          <a:fillRef idx="0">
+            <a:schemeClr val="dk1"/>
+          </a:fillRef>
+          <a:effectRef idx="2">
+            <a:schemeClr val="dk1"/>
+          </a:effectRef>
+          <a:fontRef idx="minor">
+            <a:schemeClr val="tx1"/>
+          </a:fontRef>
+        </p:style>
+      </p:cxnSp>
+      <p:sp>
+        <p:nvSpPr>
+          <p:cNvPr id="18" name="正方形/長方形 17"/>
+          <p:cNvSpPr/>
+          <p:nvPr/>
+        </p:nvSpPr>
+        <p:spPr>
+          <a:xfrm>
+            <a:off x="3159647" y="1781108"/>
+            <a:ext cx="1161444" cy="875956"/>
+          </a:xfrm>
+          <a:prstGeom prst="rect">
+            <a:avLst/>
+          </a:prstGeom>
+        </p:spPr>
+        <p:style>
+          <a:lnRef idx="1">
+            <a:schemeClr val="accent1"/>
+          </a:lnRef>
+          <a:fillRef idx="3">
+            <a:schemeClr val="accent1"/>
+          </a:fillRef>
+          <a:effectRef idx="2">
+            <a:schemeClr val="accent1"/>
+          </a:effectRef>
+          <a:fontRef idx="minor">
+            <a:schemeClr val="lt1"/>
+          </a:fontRef>
+        </p:style>
+        <p:txBody>
+          <a:bodyPr rtlCol="0" anchor="t"/>
+          <a:lstStyle/>
+          <a:p>
+            <a:pPr algn="ctr"/>
+            <a:r>
+              <a:rPr kumimoji="1" lang="en-US" altLang="ja-JP" dirty="0" err="1" smtClean="0"/>
+              <a:t>vna</a:t>
+            </a:r>
+            <a:endParaRPr kumimoji="1" lang="ja-JP" altLang="en-US" dirty="0"/>
+          </a:p>
+        </p:txBody>
+      </p:sp>
+      <p:sp>
+        <p:nvSpPr>
+          <p:cNvPr id="19" name="正方形/長方形 18"/>
+          <p:cNvSpPr/>
+          <p:nvPr/>
+        </p:nvSpPr>
+        <p:spPr>
+          <a:xfrm>
+            <a:off x="3335707" y="2321283"/>
+            <a:ext cx="810205" cy="335781"/>
+          </a:xfrm>
+          <a:prstGeom prst="rect">
+            <a:avLst/>
+          </a:prstGeom>
+        </p:spPr>
+        <p:style>
+          <a:lnRef idx="1">
+            <a:schemeClr val="accent1"/>
+          </a:lnRef>
+          <a:fillRef idx="3">
+            <a:schemeClr val="accent1"/>
+          </a:fillRef>
+          <a:effectRef idx="2">
+            <a:schemeClr val="accent1"/>
+          </a:effectRef>
+          <a:fontRef idx="minor">
+            <a:schemeClr val="lt1"/>
+          </a:fontRef>
+        </p:style>
+        <p:txBody>
+          <a:bodyPr rtlCol="0" anchor="ctr"/>
+          <a:lstStyle/>
+          <a:p>
+            <a:pPr algn="ctr"/>
+            <a:r>
+              <a:rPr kumimoji="1" lang="en-US" altLang="ja-JP" dirty="0" err="1" smtClean="0"/>
+              <a:t>Trema</a:t>
+            </a:r>
+            <a:endParaRPr kumimoji="1" lang="ja-JP" altLang="en-US" dirty="0"/>
+          </a:p>
+        </p:txBody>
+      </p:sp>
+      <p:cxnSp>
+        <p:nvCxnSpPr>
+          <p:cNvPr id="21" name="カギ線コネクタ 20"/>
+          <p:cNvCxnSpPr>
+            <a:stCxn id="19" idx="2"/>
+            <a:endCxn id="4" idx="3"/>
+          </p:cNvCxnSpPr>
+          <p:nvPr/>
+        </p:nvCxnSpPr>
+        <p:spPr>
+          <a:xfrm rot="5400000">
+            <a:off x="2910505" y="2695415"/>
+            <a:ext cx="868656" cy="791955"/>
+          </a:xfrm>
+          <a:prstGeom prst="bentConnector2">
+            <a:avLst/>
+          </a:prstGeom>
+        </p:spPr>
+        <p:style>
+          <a:lnRef idx="3">
+            <a:schemeClr val="dk1"/>
+          </a:lnRef>
+          <a:fillRef idx="0">
+            <a:schemeClr val="dk1"/>
+          </a:fillRef>
+          <a:effectRef idx="2">
+            <a:schemeClr val="dk1"/>
+          </a:effectRef>
+          <a:fontRef idx="minor">
+            <a:schemeClr val="tx1"/>
+          </a:fontRef>
+        </p:style>
+      </p:cxnSp>
+      <p:grpSp>
+        <p:nvGrpSpPr>
+          <p:cNvPr id="22" name="図形グループ 21"/>
+          <p:cNvGrpSpPr/>
+          <p:nvPr/>
+        </p:nvGrpSpPr>
+        <p:grpSpPr>
+          <a:xfrm>
+            <a:off x="2189093" y="4532176"/>
+            <a:ext cx="2218939" cy="540173"/>
+            <a:chOff x="861298" y="3255633"/>
+            <a:chExt cx="2218939" cy="540173"/>
+          </a:xfrm>
+        </p:grpSpPr>
+        <p:sp>
+          <p:nvSpPr>
+            <p:cNvPr id="23" name="角丸四角形 22"/>
+            <p:cNvSpPr/>
+            <p:nvPr/>
+          </p:nvSpPr>
+          <p:spPr>
+            <a:xfrm>
+              <a:off x="861298" y="3255633"/>
+              <a:ext cx="2218939" cy="540173"/>
+            </a:xfrm>
+            <a:prstGeom prst="roundRect">
+              <a:avLst/>
+            </a:prstGeom>
+          </p:spPr>
+          <p:style>
+            <a:lnRef idx="1">
+              <a:schemeClr val="accent1"/>
+            </a:lnRef>
+            <a:fillRef idx="3">
+              <a:schemeClr val="accent1"/>
+            </a:fillRef>
+            <a:effectRef idx="2">
+              <a:schemeClr val="accent1"/>
+            </a:effectRef>
+            <a:fontRef idx="minor">
+              <a:schemeClr val="lt1"/>
+            </a:fontRef>
+          </p:style>
+          <p:txBody>
+            <a:bodyPr rtlCol="0" anchor="ctr"/>
+            <a:lstStyle/>
+            <a:p>
+              <a:pPr algn="ctr"/>
+              <a:endParaRPr kumimoji="1" lang="ja-JP" altLang="en-US"/>
+            </a:p>
+          </p:txBody>
+        </p:sp>
+        <p:sp>
+          <p:nvSpPr>
+            <p:cNvPr id="24" name="正方形/長方形 23"/>
+            <p:cNvSpPr/>
+            <p:nvPr/>
+          </p:nvSpPr>
+          <p:spPr>
+            <a:xfrm>
+              <a:off x="1007281" y="3401626"/>
+              <a:ext cx="233572" cy="233588"/>
+            </a:xfrm>
+            <a:prstGeom prst="rect">
+              <a:avLst/>
+            </a:prstGeom>
+          </p:spPr>
+          <p:style>
+            <a:lnRef idx="2">
+              <a:schemeClr val="dk1">
+                <a:shade val="50000"/>
+              </a:schemeClr>
+            </a:lnRef>
+            <a:fillRef idx="1">
+              <a:schemeClr val="dk1"/>
+            </a:fillRef>
+            <a:effectRef idx="0">
+              <a:schemeClr val="dk1"/>
+            </a:effectRef>
+            <a:fontRef idx="minor">
+              <a:schemeClr val="lt1"/>
+            </a:fontRef>
+          </p:style>
+          <p:txBody>
+            <a:bodyPr rtlCol="0" anchor="ctr"/>
+            <a:lstStyle/>
+            <a:p>
+              <a:pPr algn="ctr"/>
+              <a:endParaRPr kumimoji="1" lang="ja-JP" altLang="en-US"/>
+            </a:p>
+          </p:txBody>
+        </p:sp>
+        <p:sp>
+          <p:nvSpPr>
+            <p:cNvPr id="25" name="正方形/長方形 24"/>
+            <p:cNvSpPr/>
+            <p:nvPr/>
+          </p:nvSpPr>
+          <p:spPr>
+            <a:xfrm>
+              <a:off x="1393253" y="3401626"/>
+              <a:ext cx="233572" cy="233588"/>
+            </a:xfrm>
+            <a:prstGeom prst="rect">
+              <a:avLst/>
+            </a:prstGeom>
+          </p:spPr>
+          <p:style>
+            <a:lnRef idx="2">
+              <a:schemeClr val="dk1">
+                <a:shade val="50000"/>
+              </a:schemeClr>
+            </a:lnRef>
+            <a:fillRef idx="1">
+              <a:schemeClr val="dk1"/>
+            </a:fillRef>
+            <a:effectRef idx="0">
+              <a:schemeClr val="dk1"/>
+            </a:effectRef>
+            <a:fontRef idx="minor">
+              <a:schemeClr val="lt1"/>
+            </a:fontRef>
+          </p:style>
+          <p:txBody>
+            <a:bodyPr rtlCol="0" anchor="ctr"/>
+            <a:lstStyle/>
+            <a:p>
+              <a:pPr algn="ctr"/>
+              <a:endParaRPr kumimoji="1" lang="ja-JP" altLang="en-US"/>
+            </a:p>
+          </p:txBody>
+        </p:sp>
+        <p:sp>
+          <p:nvSpPr>
+            <p:cNvPr id="26" name="正方形/長方形 25"/>
+            <p:cNvSpPr/>
+            <p:nvPr/>
+          </p:nvSpPr>
+          <p:spPr>
+            <a:xfrm>
+              <a:off x="1785641" y="3401626"/>
+              <a:ext cx="233572" cy="233588"/>
+            </a:xfrm>
+            <a:prstGeom prst="rect">
+              <a:avLst/>
+            </a:prstGeom>
+          </p:spPr>
+          <p:style>
+            <a:lnRef idx="2">
+              <a:schemeClr val="dk1">
+                <a:shade val="50000"/>
+              </a:schemeClr>
+            </a:lnRef>
+            <a:fillRef idx="1">
+              <a:schemeClr val="dk1"/>
+            </a:fillRef>
+            <a:effectRef idx="0">
+              <a:schemeClr val="dk1"/>
+            </a:effectRef>
+            <a:fontRef idx="minor">
+              <a:schemeClr val="lt1"/>
+            </a:fontRef>
+          </p:style>
+          <p:txBody>
+            <a:bodyPr rtlCol="0" anchor="ctr"/>
+            <a:lstStyle/>
+            <a:p>
+              <a:pPr algn="ctr"/>
+              <a:endParaRPr kumimoji="1" lang="ja-JP" altLang="en-US"/>
+            </a:p>
+          </p:txBody>
+        </p:sp>
+        <p:sp>
+          <p:nvSpPr>
+            <p:cNvPr id="27" name="正方形/長方形 26"/>
+            <p:cNvSpPr/>
+            <p:nvPr/>
+          </p:nvSpPr>
+          <p:spPr>
+            <a:xfrm>
+              <a:off x="2171613" y="3401626"/>
+              <a:ext cx="233572" cy="233588"/>
+            </a:xfrm>
+            <a:prstGeom prst="rect">
+              <a:avLst/>
+            </a:prstGeom>
+          </p:spPr>
+          <p:style>
+            <a:lnRef idx="2">
+              <a:schemeClr val="dk1">
+                <a:shade val="50000"/>
+              </a:schemeClr>
+            </a:lnRef>
+            <a:fillRef idx="1">
+              <a:schemeClr val="dk1"/>
+            </a:fillRef>
+            <a:effectRef idx="0">
+              <a:schemeClr val="dk1"/>
+            </a:effectRef>
+            <a:fontRef idx="minor">
+              <a:schemeClr val="lt1"/>
+            </a:fontRef>
+          </p:style>
+          <p:txBody>
+            <a:bodyPr rtlCol="0" anchor="ctr"/>
+            <a:lstStyle/>
+            <a:p>
+              <a:pPr algn="ctr"/>
+              <a:endParaRPr kumimoji="1" lang="ja-JP" altLang="en-US"/>
+            </a:p>
+          </p:txBody>
+        </p:sp>
+        <p:sp>
+          <p:nvSpPr>
+            <p:cNvPr id="28" name="正方形/長方形 27"/>
+            <p:cNvSpPr/>
+            <p:nvPr/>
+          </p:nvSpPr>
+          <p:spPr>
+            <a:xfrm>
+              <a:off x="2557585" y="3401626"/>
+              <a:ext cx="233572" cy="233588"/>
+            </a:xfrm>
+            <a:prstGeom prst="rect">
+              <a:avLst/>
+            </a:prstGeom>
+          </p:spPr>
+          <p:style>
+            <a:lnRef idx="2">
+              <a:schemeClr val="dk1">
+                <a:shade val="50000"/>
+              </a:schemeClr>
+            </a:lnRef>
+            <a:fillRef idx="1">
+              <a:schemeClr val="dk1"/>
+            </a:fillRef>
+            <a:effectRef idx="0">
+              <a:schemeClr val="dk1"/>
+            </a:effectRef>
+            <a:fontRef idx="minor">
+              <a:schemeClr val="lt1"/>
+            </a:fontRef>
+          </p:style>
+          <p:txBody>
+            <a:bodyPr rtlCol="0" anchor="ctr"/>
+            <a:lstStyle/>
+            <a:p>
+              <a:pPr algn="ctr"/>
+              <a:endParaRPr kumimoji="1" lang="ja-JP" altLang="en-US"/>
+            </a:p>
+          </p:txBody>
+        </p:sp>
+      </p:grpSp>
+      <p:cxnSp>
+        <p:nvCxnSpPr>
+          <p:cNvPr id="29" name="直線コネクタ 28"/>
+          <p:cNvCxnSpPr>
+            <a:stCxn id="9" idx="2"/>
+            <a:endCxn id="25" idx="0"/>
+          </p:cNvCxnSpPr>
+          <p:nvPr/>
+        </p:nvCxnSpPr>
+        <p:spPr>
+          <a:xfrm>
+            <a:off x="2601381" y="3635214"/>
+            <a:ext cx="236453" cy="1042955"/>
+          </a:xfrm>
+          <a:prstGeom prst="line">
+            <a:avLst/>
+          </a:prstGeom>
+        </p:spPr>
+        <p:style>
+          <a:lnRef idx="3">
+            <a:schemeClr val="dk1"/>
+          </a:lnRef>
+          <a:fillRef idx="0">
+            <a:schemeClr val="dk1"/>
+          </a:fillRef>
+          <a:effectRef idx="2">
+            <a:schemeClr val="dk1"/>
+          </a:effectRef>
+          <a:fontRef idx="minor">
+            <a:schemeClr val="tx1"/>
+          </a:fontRef>
+        </p:style>
+      </p:cxnSp>
+      <p:sp>
+        <p:nvSpPr>
+          <p:cNvPr id="32" name="正方形/長方形 31"/>
+          <p:cNvSpPr/>
+          <p:nvPr/>
+        </p:nvSpPr>
+        <p:spPr>
+          <a:xfrm>
+            <a:off x="4830269" y="3635213"/>
+            <a:ext cx="1161444" cy="496375"/>
+          </a:xfrm>
+          <a:prstGeom prst="rect">
+            <a:avLst/>
+          </a:prstGeom>
+        </p:spPr>
+        <p:style>
+          <a:lnRef idx="1">
+            <a:schemeClr val="accent1"/>
+          </a:lnRef>
+          <a:fillRef idx="3">
+            <a:schemeClr val="accent1"/>
+          </a:fillRef>
+          <a:effectRef idx="2">
+            <a:schemeClr val="accent1"/>
+          </a:effectRef>
+          <a:fontRef idx="minor">
+            <a:schemeClr val="lt1"/>
+          </a:fontRef>
+        </p:style>
+        <p:txBody>
+          <a:bodyPr rtlCol="0" anchor="ctr"/>
+          <a:lstStyle/>
+          <a:p>
+            <a:pPr algn="ctr"/>
+            <a:r>
+              <a:rPr kumimoji="1" lang="en-US" altLang="ja-JP" dirty="0" smtClean="0"/>
+              <a:t>DHCP</a:t>
+            </a:r>
+            <a:endParaRPr kumimoji="1" lang="ja-JP" altLang="en-US" dirty="0"/>
+          </a:p>
+        </p:txBody>
+      </p:sp>
+      <p:cxnSp>
+        <p:nvCxnSpPr>
+          <p:cNvPr id="33" name="直線コネクタ 32"/>
+          <p:cNvCxnSpPr>
+            <a:stCxn id="32" idx="2"/>
+            <a:endCxn id="28" idx="0"/>
+          </p:cNvCxnSpPr>
+          <p:nvPr/>
+        </p:nvCxnSpPr>
+        <p:spPr>
+          <a:xfrm flipH="1">
+            <a:off x="4002166" y="4131588"/>
+            <a:ext cx="1408825" cy="546581"/>
+          </a:xfrm>
+          <a:prstGeom prst="line">
+            <a:avLst/>
+          </a:prstGeom>
+        </p:spPr>
+        <p:style>
+          <a:lnRef idx="3">
+            <a:schemeClr val="dk1"/>
+          </a:lnRef>
+          <a:fillRef idx="0">
+            <a:schemeClr val="dk1"/>
+          </a:fillRef>
+          <a:effectRef idx="2">
+            <a:schemeClr val="dk1"/>
+          </a:effectRef>
+          <a:fontRef idx="minor">
+            <a:schemeClr val="tx1"/>
+          </a:fontRef>
+        </p:style>
+      </p:cxnSp>
+      <p:sp>
+        <p:nvSpPr>
+          <p:cNvPr id="37" name="フリーフォーム 36"/>
+          <p:cNvSpPr/>
+          <p:nvPr/>
+        </p:nvSpPr>
+        <p:spPr>
+          <a:xfrm>
+            <a:off x="686120" y="2511072"/>
+            <a:ext cx="4481672" cy="2235510"/>
+          </a:xfrm>
+          <a:custGeom>
+            <a:avLst/>
+            <a:gdLst>
+              <a:gd name="connsiteX0" fmla="*/ 233572 w 4481672"/>
+              <a:gd name="connsiteY0" fmla="*/ 0 h 2235510"/>
+              <a:gd name="connsiteX1" fmla="*/ 102187 w 4481672"/>
+              <a:gd name="connsiteY1" fmla="*/ 992749 h 2235510"/>
+              <a:gd name="connsiteX2" fmla="*/ 1547417 w 4481672"/>
+              <a:gd name="connsiteY2" fmla="*/ 1255536 h 2235510"/>
+              <a:gd name="connsiteX3" fmla="*/ 1941571 w 4481672"/>
+              <a:gd name="connsiteY3" fmla="*/ 2233686 h 2235510"/>
+              <a:gd name="connsiteX4" fmla="*/ 4481672 w 4481672"/>
+              <a:gd name="connsiteY4" fmla="*/ 1518322 h 2235510"/>
+            </a:gdLst>
+            <a:ahLst/>
+            <a:cxnLst>
+              <a:cxn ang="0">
+                <a:pos x="connsiteX0" y="connsiteY0"/>
+              </a:cxn>
+              <a:cxn ang="0">
+                <a:pos x="connsiteX1" y="connsiteY1"/>
+              </a:cxn>
+              <a:cxn ang="0">
+                <a:pos x="connsiteX2" y="connsiteY2"/>
+              </a:cxn>
+              <a:cxn ang="0">
+                <a:pos x="connsiteX3" y="connsiteY3"/>
+              </a:cxn>
+              <a:cxn ang="0">
+                <a:pos x="connsiteX4" y="connsiteY4"/>
+              </a:cxn>
+            </a:cxnLst>
+            <a:rect l="l" t="t" r="r" b="b"/>
+            <a:pathLst>
+              <a:path w="4481672" h="2235510">
+                <a:moveTo>
+                  <a:pt x="233572" y="0"/>
+                </a:moveTo>
+                <a:cubicBezTo>
+                  <a:pt x="58392" y="391746"/>
+                  <a:pt x="-116787" y="783493"/>
+                  <a:pt x="102187" y="992749"/>
+                </a:cubicBezTo>
+                <a:cubicBezTo>
+                  <a:pt x="321161" y="1202005"/>
+                  <a:pt x="1240853" y="1048713"/>
+                  <a:pt x="1547417" y="1255536"/>
+                </a:cubicBezTo>
+                <a:cubicBezTo>
+                  <a:pt x="1853981" y="1462359"/>
+                  <a:pt x="1452529" y="2189888"/>
+                  <a:pt x="1941571" y="2233686"/>
+                </a:cubicBezTo>
+                <a:cubicBezTo>
+                  <a:pt x="2430613" y="2277484"/>
+                  <a:pt x="4481672" y="1518322"/>
+                  <a:pt x="4481672" y="1518322"/>
+                </a:cubicBezTo>
+              </a:path>
+            </a:pathLst>
+          </a:custGeom>
+          <a:ln w="76200" cmpd="sng">
+            <a:solidFill>
+              <a:srgbClr val="FF0000"/>
+            </a:solidFill>
+            <a:tailEnd type="arrow"/>
+          </a:ln>
+        </p:spPr>
+        <p:style>
+          <a:lnRef idx="2">
+            <a:schemeClr val="accent1"/>
+          </a:lnRef>
+          <a:fillRef idx="0">
+            <a:schemeClr val="accent1"/>
+          </a:fillRef>
+          <a:effectRef idx="1">
+            <a:schemeClr val="accent1"/>
+          </a:effectRef>
+          <a:fontRef idx="minor">
+            <a:schemeClr val="tx1"/>
+          </a:fontRef>
+        </p:style>
+        <p:txBody>
+          <a:bodyPr rtlCol="0" anchor="ctr"/>
+          <a:lstStyle/>
+          <a:p>
+            <a:pPr algn="ctr"/>
+            <a:endParaRPr kumimoji="1" lang="ja-JP" altLang="en-US"/>
+          </a:p>
+        </p:txBody>
+      </p:sp>
+      <p:sp>
+        <p:nvSpPr>
+          <p:cNvPr id="38" name="フリーフォーム 37"/>
+          <p:cNvSpPr/>
+          <p:nvPr/>
+        </p:nvSpPr>
+        <p:spPr>
+          <a:xfrm>
+            <a:off x="1248664" y="2569470"/>
+            <a:ext cx="2386309" cy="864340"/>
+          </a:xfrm>
+          <a:custGeom>
+            <a:avLst/>
+            <a:gdLst>
+              <a:gd name="connsiteX0" fmla="*/ 278573 w 2453720"/>
+              <a:gd name="connsiteY0" fmla="*/ 0 h 841207"/>
+              <a:gd name="connsiteX1" fmla="*/ 147189 w 2453720"/>
+              <a:gd name="connsiteY1" fmla="*/ 656966 h 841207"/>
+              <a:gd name="connsiteX2" fmla="*/ 2074162 w 2453720"/>
+              <a:gd name="connsiteY2" fmla="*/ 802959 h 841207"/>
+              <a:gd name="connsiteX3" fmla="*/ 2453718 w 2453720"/>
+              <a:gd name="connsiteY3" fmla="*/ 58397 h 841207"/>
+              <a:gd name="connsiteX0" fmla="*/ 211164 w 2386309"/>
+              <a:gd name="connsiteY0" fmla="*/ 0 h 864340"/>
+              <a:gd name="connsiteX1" fmla="*/ 181968 w 2386309"/>
+              <a:gd name="connsiteY1" fmla="*/ 729962 h 864340"/>
+              <a:gd name="connsiteX2" fmla="*/ 2006753 w 2386309"/>
+              <a:gd name="connsiteY2" fmla="*/ 802959 h 864340"/>
+              <a:gd name="connsiteX3" fmla="*/ 2386309 w 2386309"/>
+              <a:gd name="connsiteY3" fmla="*/ 58397 h 864340"/>
+            </a:gdLst>
+            <a:ahLst/>
+            <a:cxnLst>
+              <a:cxn ang="0">
+                <a:pos x="connsiteX0" y="connsiteY0"/>
+              </a:cxn>
+              <a:cxn ang="0">
+                <a:pos x="connsiteX1" y="connsiteY1"/>
+              </a:cxn>
+              <a:cxn ang="0">
+                <a:pos x="connsiteX2" y="connsiteY2"/>
+              </a:cxn>
+              <a:cxn ang="0">
+                <a:pos x="connsiteX3" y="connsiteY3"/>
+              </a:cxn>
+            </a:cxnLst>
+            <a:rect l="l" t="t" r="r" b="b"/>
+            <a:pathLst>
+              <a:path w="2386309" h="864340">
+                <a:moveTo>
+                  <a:pt x="211164" y="0"/>
+                </a:moveTo>
+                <a:cubicBezTo>
+                  <a:pt x="-4161" y="261570"/>
+                  <a:pt x="-117297" y="596136"/>
+                  <a:pt x="181968" y="729962"/>
+                </a:cubicBezTo>
+                <a:cubicBezTo>
+                  <a:pt x="481233" y="863789"/>
+                  <a:pt x="1639363" y="914886"/>
+                  <a:pt x="2006753" y="802959"/>
+                </a:cubicBezTo>
+                <a:cubicBezTo>
+                  <a:pt x="2374143" y="691032"/>
+                  <a:pt x="2386309" y="58397"/>
+                  <a:pt x="2386309" y="58397"/>
+                </a:cubicBezTo>
+              </a:path>
+            </a:pathLst>
+          </a:custGeom>
+          <a:ln w="76200" cmpd="sng">
+            <a:solidFill>
+              <a:srgbClr val="FF0000"/>
+            </a:solidFill>
+            <a:tailEnd type="arrow"/>
+          </a:ln>
+        </p:spPr>
+        <p:style>
+          <a:lnRef idx="2">
+            <a:schemeClr val="accent1"/>
+          </a:lnRef>
+          <a:fillRef idx="0">
+            <a:schemeClr val="accent1"/>
+          </a:fillRef>
+          <a:effectRef idx="1">
+            <a:schemeClr val="accent1"/>
+          </a:effectRef>
+          <a:fontRef idx="minor">
+            <a:schemeClr val="tx1"/>
+          </a:fontRef>
+        </p:style>
+        <p:txBody>
+          <a:bodyPr rtlCol="0" anchor="ctr"/>
+          <a:lstStyle/>
+          <a:p>
+            <a:pPr algn="ctr"/>
+            <a:endParaRPr kumimoji="1" lang="ja-JP" altLang="en-US"/>
+          </a:p>
+        </p:txBody>
+      </p:sp>
+      <p:sp>
+        <p:nvSpPr>
+          <p:cNvPr id="39" name="テキスト ボックス 38"/>
+          <p:cNvSpPr txBox="1"/>
+          <p:nvPr/>
+        </p:nvSpPr>
+        <p:spPr>
+          <a:xfrm>
+            <a:off x="2921895" y="3689260"/>
+            <a:ext cx="1446405" cy="738664"/>
+          </a:xfrm>
+          <a:prstGeom prst="rect">
+            <a:avLst/>
+          </a:prstGeom>
+          <a:noFill/>
+        </p:spPr>
+        <p:txBody>
+          <a:bodyPr wrap="none" rtlCol="0">
+            <a:spAutoFit/>
+          </a:bodyPr>
+          <a:lstStyle/>
+          <a:p>
+            <a:pPr algn="r"/>
+            <a:r>
+              <a:rPr kumimoji="1" lang="en-US" altLang="ja-JP" sz="1400" b="1" dirty="0" smtClean="0">
+                <a:solidFill>
+                  <a:srgbClr val="FF0000"/>
+                </a:solidFill>
+              </a:rPr>
+              <a:t>(B) </a:t>
+            </a:r>
+            <a:r>
+              <a:rPr kumimoji="1" lang="ja-JP" altLang="en-US" sz="1400" b="1" dirty="0" smtClean="0">
+                <a:solidFill>
+                  <a:srgbClr val="FF0000"/>
+                </a:solidFill>
+              </a:rPr>
+              <a:t>一般的な</a:t>
+            </a:r>
+            <a:r>
+              <a:rPr kumimoji="1" lang="en-US" altLang="ja-JP" sz="1400" b="1" dirty="0" smtClean="0">
+                <a:solidFill>
+                  <a:srgbClr val="FF0000"/>
+                </a:solidFill>
+              </a:rPr>
+              <a:t/>
+            </a:r>
+            <a:br>
+              <a:rPr kumimoji="1" lang="en-US" altLang="ja-JP" sz="1400" b="1" dirty="0" smtClean="0">
+                <a:solidFill>
+                  <a:srgbClr val="FF0000"/>
+                </a:solidFill>
+              </a:rPr>
+            </a:br>
+            <a:r>
+              <a:rPr kumimoji="1" lang="en-US" altLang="ja-JP" sz="1400" b="1" dirty="0" smtClean="0">
+                <a:solidFill>
+                  <a:srgbClr val="FF0000"/>
+                </a:solidFill>
+              </a:rPr>
+              <a:t>DHCP</a:t>
+            </a:r>
+            <a:r>
+              <a:rPr kumimoji="1" lang="ja-JP" altLang="en-US" sz="1400" b="1" dirty="0" smtClean="0">
+                <a:solidFill>
+                  <a:srgbClr val="FF0000"/>
+                </a:solidFill>
+              </a:rPr>
+              <a:t>サーバとの</a:t>
+            </a:r>
+            <a:r>
+              <a:rPr kumimoji="1" lang="en-US" altLang="ja-JP" sz="1400" b="1" dirty="0" smtClean="0">
+                <a:solidFill>
+                  <a:srgbClr val="FF0000"/>
+                </a:solidFill>
+              </a:rPr>
+              <a:t/>
+            </a:r>
+            <a:br>
+              <a:rPr kumimoji="1" lang="en-US" altLang="ja-JP" sz="1400" b="1" dirty="0" smtClean="0">
+                <a:solidFill>
+                  <a:srgbClr val="FF0000"/>
+                </a:solidFill>
+              </a:rPr>
+            </a:br>
+            <a:r>
+              <a:rPr kumimoji="1" lang="ja-JP" altLang="en-US" sz="1400" b="1" dirty="0" smtClean="0">
+                <a:solidFill>
+                  <a:srgbClr val="FF0000"/>
+                </a:solidFill>
+              </a:rPr>
+              <a:t>通信経路</a:t>
+            </a:r>
+            <a:endParaRPr kumimoji="1" lang="ja-JP" altLang="en-US" sz="1400" b="1" dirty="0">
+              <a:solidFill>
+                <a:srgbClr val="FF0000"/>
+              </a:solidFill>
+            </a:endParaRPr>
+          </a:p>
+        </p:txBody>
+      </p:sp>
+      <p:sp>
+        <p:nvSpPr>
+          <p:cNvPr id="40" name="テキスト ボックス 39"/>
+          <p:cNvSpPr txBox="1"/>
+          <p:nvPr/>
+        </p:nvSpPr>
+        <p:spPr>
+          <a:xfrm>
+            <a:off x="3721121" y="2673720"/>
+            <a:ext cx="1458264" cy="738664"/>
+          </a:xfrm>
+          <a:prstGeom prst="rect">
+            <a:avLst/>
+          </a:prstGeom>
+          <a:noFill/>
+        </p:spPr>
+        <p:txBody>
+          <a:bodyPr wrap="none" rtlCol="0">
+            <a:spAutoFit/>
+          </a:bodyPr>
+          <a:lstStyle/>
+          <a:p>
+            <a:pPr algn="r"/>
+            <a:r>
+              <a:rPr kumimoji="1" lang="en-US" altLang="ja-JP" sz="1400" b="1" dirty="0" smtClean="0">
+                <a:solidFill>
+                  <a:srgbClr val="FF0000"/>
+                </a:solidFill>
+              </a:rPr>
+              <a:t>(A) </a:t>
+            </a:r>
+            <a:r>
+              <a:rPr lang="en-US" altLang="ja-JP" sz="1400" b="1" dirty="0" err="1" smtClean="0">
+                <a:solidFill>
+                  <a:srgbClr val="FF0000"/>
+                </a:solidFill>
+              </a:rPr>
+              <a:t>OpenVNet</a:t>
+            </a:r>
+            <a:r>
+              <a:rPr lang="ja-JP" altLang="en-US" sz="1400" b="1" dirty="0" smtClean="0">
+                <a:solidFill>
+                  <a:srgbClr val="FF0000"/>
+                </a:solidFill>
+              </a:rPr>
+              <a:t>の</a:t>
+            </a:r>
+            <a:r>
+              <a:rPr lang="en-US" altLang="ja-JP" sz="1400" b="1" dirty="0" smtClean="0">
+                <a:solidFill>
+                  <a:srgbClr val="FF0000"/>
+                </a:solidFill>
+              </a:rPr>
+              <a:t/>
+            </a:r>
+            <a:br>
+              <a:rPr lang="en-US" altLang="ja-JP" sz="1400" b="1" dirty="0" smtClean="0">
+                <a:solidFill>
+                  <a:srgbClr val="FF0000"/>
+                </a:solidFill>
+              </a:rPr>
+            </a:br>
+            <a:r>
+              <a:rPr lang="en-US" altLang="ja-JP" sz="1400" b="1" dirty="0" smtClean="0">
+                <a:solidFill>
+                  <a:srgbClr val="FF0000"/>
+                </a:solidFill>
+              </a:rPr>
+              <a:t>DHCP</a:t>
+            </a:r>
+            <a:r>
+              <a:rPr lang="ja-JP" altLang="en-US" sz="1400" b="1" dirty="0" smtClean="0">
+                <a:solidFill>
+                  <a:srgbClr val="FF0000"/>
+                </a:solidFill>
+              </a:rPr>
+              <a:t>サーバとの</a:t>
+            </a:r>
+            <a:r>
+              <a:rPr lang="en-US" altLang="ja-JP" sz="1400" b="1" dirty="0" smtClean="0">
+                <a:solidFill>
+                  <a:srgbClr val="FF0000"/>
+                </a:solidFill>
+              </a:rPr>
+              <a:t/>
+            </a:r>
+            <a:br>
+              <a:rPr lang="en-US" altLang="ja-JP" sz="1400" b="1" dirty="0" smtClean="0">
+                <a:solidFill>
+                  <a:srgbClr val="FF0000"/>
+                </a:solidFill>
+              </a:rPr>
+            </a:br>
+            <a:r>
+              <a:rPr lang="ja-JP" altLang="en-US" sz="1400" b="1" dirty="0" smtClean="0">
+                <a:solidFill>
+                  <a:srgbClr val="FF0000"/>
+                </a:solidFill>
+              </a:rPr>
+              <a:t>通信経路</a:t>
+            </a:r>
+            <a:endParaRPr kumimoji="1" lang="ja-JP" altLang="en-US" sz="1400" b="1" dirty="0">
+              <a:solidFill>
+                <a:srgbClr val="FF0000"/>
+              </a:solidFill>
+            </a:endParaRPr>
+          </a:p>
+        </p:txBody>
+      </p:sp>
+    </p:spTree>
+    <p:extLst>
+      <p:ext uri="{BB962C8B-B14F-4D97-AF65-F5344CB8AC3E}">
+        <p14:creationId xmlns:p14="http://schemas.microsoft.com/office/powerpoint/2010/main" val="176661495"/>
+      </p:ext>
+    </p:extLst>
+  </p:cSld>
+  <p:clrMapOvr>
+    <a:masterClrMapping/>
+  </p:clrMapOvr>
+</p:sld>
+</file>
+
+<file path=ppt/slides/slide4.xml><?xml version="1.0" encoding="utf-8"?>
 <p:sld xmlns:a="http://schemas.openxmlformats.org/drawingml/2006/main" xmlns:r="http://schemas.openxmlformats.org/officeDocument/2006/relationships" xmlns:p="http://schemas.openxmlformats.org/presentationml/2006/main">
   <p:cSld>
     <p:spTree>

</xml_diff>